<commit_message>
Respond the comment: The re-ranking performance should explain the need for Lattice + Transformer (Encoder)? and why transformers are used? How performance is increased using Lattice + Transformer (Encoder). What does the cost of performance, mean with the same computational resources? The Lattice + Transformer (Encoder) model needs to be explained more in detail with diagrams.
</commit_message>
<xml_diff>
--- a/contents/fig;lattice-v3.pptx
+++ b/contents/fig;lattice-v3.pptx
@@ -9187,20 +9187,20 @@
             <a:p>
               <a:pPr algn="ctr"/>
               <a:r>
-                <a:rPr lang="ko-KR" altLang="en-US" sz="1400" dirty="0">
+                <a:rPr lang="ko-KR" altLang="en-US" sz="1400" b="1" u="sng" dirty="0">
                   <a:latin typeface="D2Coding" panose="020B0609020101020101" pitchFamily="49" charset="-127"/>
                   <a:ea typeface="D2Coding" panose="020B0609020101020101" pitchFamily="49" charset="-127"/>
                 </a:rPr>
                 <a:t>을</a:t>
               </a:r>
               <a:r>
-                <a:rPr lang="en-US" altLang="ko-KR" sz="1400" dirty="0">
+                <a:rPr lang="en-US" altLang="ko-KR" sz="1400" b="1" u="sng" dirty="0">
                   <a:latin typeface="D2Coding" panose="020B0609020101020101" pitchFamily="49" charset="-127"/>
                   <a:ea typeface="D2Coding" panose="020B0609020101020101" pitchFamily="49" charset="-127"/>
                 </a:rPr>
                 <a:t>/JKO</a:t>
               </a:r>
-              <a:endParaRPr lang="ko-KR" altLang="en-US" sz="1400" dirty="0">
+              <a:endParaRPr lang="ko-KR" altLang="en-US" sz="1400" b="1" u="sng" dirty="0">
                 <a:latin typeface="D2Coding" panose="020B0609020101020101" pitchFamily="49" charset="-127"/>
                 <a:ea typeface="D2Coding" panose="020B0609020101020101" pitchFamily="49" charset="-127"/>
               </a:endParaRPr>
@@ -9255,48 +9255,48 @@
             <a:p>
               <a:pPr algn="ctr"/>
               <a:r>
-                <a:rPr lang="ko-KR" altLang="en-US" sz="1400" dirty="0">
+                <a:rPr lang="ko-KR" altLang="en-US" sz="1400" b="1" u="sng" dirty="0">
                   <a:latin typeface="D2Coding" panose="020B0609020101020101" pitchFamily="49" charset="-127"/>
                   <a:ea typeface="D2Coding" panose="020B0609020101020101" pitchFamily="49" charset="-127"/>
                 </a:rPr>
                 <a:t>가</a:t>
               </a:r>
               <a:r>
-                <a:rPr lang="en-US" altLang="ko-KR" sz="1400" dirty="0">
+                <a:rPr lang="en-US" altLang="ko-KR" sz="1400" b="1" u="sng" dirty="0">
                   <a:latin typeface="D2Coding" panose="020B0609020101020101" pitchFamily="49" charset="-127"/>
                   <a:ea typeface="D2Coding" panose="020B0609020101020101" pitchFamily="49" charset="-127"/>
                 </a:rPr>
                 <a:t>/</a:t>
               </a:r>
               <a:r>
-                <a:rPr lang="en" altLang="ko-KR" sz="1400" dirty="0">
+                <a:rPr lang="en" altLang="ko-KR" sz="1400" b="1" u="sng" dirty="0">
                   <a:latin typeface="D2Coding" panose="020B0609020101020101" pitchFamily="49" charset="-127"/>
                   <a:ea typeface="D2Coding" panose="020B0609020101020101" pitchFamily="49" charset="-127"/>
                 </a:rPr>
                 <a:t>VV+</a:t>
               </a:r>
               <a:r>
-                <a:rPr lang="ko-KR" altLang="en-US" sz="1400" dirty="0" err="1">
+                <a:rPr lang="ko-KR" altLang="en-US" sz="1400" b="1" u="sng" dirty="0" err="1">
                   <a:latin typeface="D2Coding" panose="020B0609020101020101" pitchFamily="49" charset="-127"/>
                   <a:ea typeface="D2Coding" panose="020B0609020101020101" pitchFamily="49" charset="-127"/>
                 </a:rPr>
                 <a:t>았</a:t>
               </a:r>
               <a:r>
-                <a:rPr lang="en-US" altLang="ko-KR" sz="1400" dirty="0">
+                <a:rPr lang="en-US" altLang="ko-KR" sz="1400" b="1" u="sng" dirty="0">
                   <a:latin typeface="D2Coding" panose="020B0609020101020101" pitchFamily="49" charset="-127"/>
                   <a:ea typeface="D2Coding" panose="020B0609020101020101" pitchFamily="49" charset="-127"/>
                 </a:rPr>
                 <a:t>/</a:t>
               </a:r>
               <a:r>
-                <a:rPr lang="en" altLang="ko-KR" sz="1400" dirty="0">
+                <a:rPr lang="en" altLang="ko-KR" sz="1400" b="1" u="sng" dirty="0">
                   <a:latin typeface="D2Coding" panose="020B0609020101020101" pitchFamily="49" charset="-127"/>
                   <a:ea typeface="D2Coding" panose="020B0609020101020101" pitchFamily="49" charset="-127"/>
                 </a:rPr>
                 <a:t>EP</a:t>
               </a:r>
-              <a:endParaRPr lang="ko-KR" altLang="en-US" sz="1400" dirty="0">
+              <a:endParaRPr lang="ko-KR" altLang="en-US" sz="1400" b="1" u="sng" dirty="0">
                 <a:latin typeface="D2Coding" panose="020B0609020101020101" pitchFamily="49" charset="-127"/>
                 <a:ea typeface="D2Coding" panose="020B0609020101020101" pitchFamily="49" charset="-127"/>
               </a:endParaRPr>
@@ -9351,20 +9351,20 @@
             <a:p>
               <a:pPr algn="ctr"/>
               <a:r>
-                <a:rPr lang="ko-KR" altLang="en-US" sz="1400" dirty="0">
+                <a:rPr lang="ko-KR" altLang="en-US" sz="1400" b="1" u="sng" dirty="0">
                   <a:latin typeface="D2Coding" panose="020B0609020101020101" pitchFamily="49" charset="-127"/>
                   <a:ea typeface="D2Coding" panose="020B0609020101020101" pitchFamily="49" charset="-127"/>
                 </a:rPr>
                 <a:t>다</a:t>
               </a:r>
               <a:r>
-                <a:rPr lang="en-US" altLang="ko-KR" sz="1400" dirty="0">
+                <a:rPr lang="en-US" altLang="ko-KR" sz="1400" b="1" u="sng" dirty="0">
                   <a:latin typeface="D2Coding" panose="020B0609020101020101" pitchFamily="49" charset="-127"/>
                   <a:ea typeface="D2Coding" panose="020B0609020101020101" pitchFamily="49" charset="-127"/>
                 </a:rPr>
                 <a:t>/EC</a:t>
               </a:r>
-              <a:endParaRPr lang="ko-KR" altLang="en-US" sz="1400" dirty="0">
+              <a:endParaRPr lang="ko-KR" altLang="en-US" sz="1400" b="1" u="sng" dirty="0">
                 <a:latin typeface="D2Coding" panose="020B0609020101020101" pitchFamily="49" charset="-127"/>
                 <a:ea typeface="D2Coding" panose="020B0609020101020101" pitchFamily="49" charset="-127"/>
               </a:endParaRPr>
@@ -9419,48 +9419,48 @@
             <a:p>
               <a:pPr algn="ctr"/>
               <a:r>
-                <a:rPr lang="ko-KR" altLang="en-US" sz="1400" dirty="0">
+                <a:rPr lang="ko-KR" altLang="en-US" sz="1400" b="1" u="sng" dirty="0">
                   <a:latin typeface="D2Coding" panose="020B0609020101020101" pitchFamily="49" charset="-127"/>
                   <a:ea typeface="D2Coding" panose="020B0609020101020101" pitchFamily="49" charset="-127"/>
                 </a:rPr>
                 <a:t>오</a:t>
               </a:r>
               <a:r>
-                <a:rPr lang="en-US" altLang="ko-KR" sz="1400" dirty="0">
+                <a:rPr lang="en-US" altLang="ko-KR" sz="1400" b="1" u="sng" dirty="0">
                   <a:latin typeface="D2Coding" panose="020B0609020101020101" pitchFamily="49" charset="-127"/>
                   <a:ea typeface="D2Coding" panose="020B0609020101020101" pitchFamily="49" charset="-127"/>
                 </a:rPr>
                 <a:t>/</a:t>
               </a:r>
               <a:r>
-                <a:rPr lang="en" altLang="ko-KR" sz="1400" dirty="0">
+                <a:rPr lang="en" altLang="ko-KR" sz="1400" b="1" u="sng" dirty="0">
                   <a:latin typeface="D2Coding" panose="020B0609020101020101" pitchFamily="49" charset="-127"/>
                   <a:ea typeface="D2Coding" panose="020B0609020101020101" pitchFamily="49" charset="-127"/>
                 </a:rPr>
                 <a:t>VX+</a:t>
               </a:r>
               <a:r>
-                <a:rPr lang="ko-KR" altLang="en-US" sz="1400" dirty="0" err="1">
+                <a:rPr lang="ko-KR" altLang="en-US" sz="1400" b="1" u="sng" dirty="0" err="1">
                   <a:latin typeface="D2Coding" panose="020B0609020101020101" pitchFamily="49" charset="-127"/>
                   <a:ea typeface="D2Coding" panose="020B0609020101020101" pitchFamily="49" charset="-127"/>
                 </a:rPr>
                 <a:t>았</a:t>
               </a:r>
               <a:r>
-                <a:rPr lang="en-US" altLang="ko-KR" sz="1400" dirty="0">
+                <a:rPr lang="en-US" altLang="ko-KR" sz="1400" b="1" u="sng" dirty="0">
                   <a:latin typeface="D2Coding" panose="020B0609020101020101" pitchFamily="49" charset="-127"/>
                   <a:ea typeface="D2Coding" panose="020B0609020101020101" pitchFamily="49" charset="-127"/>
                 </a:rPr>
                 <a:t>/</a:t>
               </a:r>
               <a:r>
-                <a:rPr lang="en" altLang="ko-KR" sz="1400" dirty="0">
+                <a:rPr lang="en" altLang="ko-KR" sz="1400" b="1" u="sng" dirty="0">
                   <a:latin typeface="D2Coding" panose="020B0609020101020101" pitchFamily="49" charset="-127"/>
                   <a:ea typeface="D2Coding" panose="020B0609020101020101" pitchFamily="49" charset="-127"/>
                 </a:rPr>
                 <a:t>EP</a:t>
               </a:r>
-              <a:endParaRPr lang="ko-KR" altLang="en-US" sz="1400" dirty="0">
+              <a:endParaRPr lang="ko-KR" altLang="en-US" sz="1400" b="1" u="sng" dirty="0">
                 <a:latin typeface="D2Coding" panose="020B0609020101020101" pitchFamily="49" charset="-127"/>
                 <a:ea typeface="D2Coding" panose="020B0609020101020101" pitchFamily="49" charset="-127"/>
               </a:endParaRPr>
@@ -9583,48 +9583,48 @@
             <a:p>
               <a:pPr algn="ctr"/>
               <a:r>
-                <a:rPr lang="ko-KR" altLang="en-US" sz="1400" dirty="0">
+                <a:rPr lang="ko-KR" altLang="en-US" sz="1400" b="1" u="sng" dirty="0">
                   <a:latin typeface="D2Coding" panose="020B0609020101020101" pitchFamily="49" charset="-127"/>
                   <a:ea typeface="D2Coding" panose="020B0609020101020101" pitchFamily="49" charset="-127"/>
                 </a:rPr>
                 <a:t>보</a:t>
               </a:r>
               <a:r>
-                <a:rPr lang="en-US" altLang="ko-KR" sz="1400" dirty="0">
+                <a:rPr lang="en-US" altLang="ko-KR" sz="1400" b="1" u="sng" dirty="0">
                   <a:latin typeface="D2Coding" panose="020B0609020101020101" pitchFamily="49" charset="-127"/>
                   <a:ea typeface="D2Coding" panose="020B0609020101020101" pitchFamily="49" charset="-127"/>
                 </a:rPr>
                 <a:t>/</a:t>
               </a:r>
               <a:r>
-                <a:rPr lang="en" altLang="ko-KR" sz="1400" dirty="0">
+                <a:rPr lang="en" altLang="ko-KR" sz="1400" b="1" u="sng" dirty="0">
                   <a:latin typeface="D2Coding" panose="020B0609020101020101" pitchFamily="49" charset="-127"/>
                   <a:ea typeface="D2Coding" panose="020B0609020101020101" pitchFamily="49" charset="-127"/>
                 </a:rPr>
                 <a:t>VX+</a:t>
               </a:r>
               <a:r>
-                <a:rPr lang="ko-KR" altLang="en-US" sz="1400" dirty="0">
+                <a:rPr lang="ko-KR" altLang="en-US" sz="1400" b="1" u="sng" dirty="0">
                   <a:latin typeface="D2Coding" panose="020B0609020101020101" pitchFamily="49" charset="-127"/>
                   <a:ea typeface="D2Coding" panose="020B0609020101020101" pitchFamily="49" charset="-127"/>
                 </a:rPr>
                 <a:t>아</a:t>
               </a:r>
               <a:r>
-                <a:rPr lang="en-US" altLang="ko-KR" sz="1400" dirty="0">
+                <a:rPr lang="en-US" altLang="ko-KR" sz="1400" b="1" u="sng" dirty="0">
                   <a:latin typeface="D2Coding" panose="020B0609020101020101" pitchFamily="49" charset="-127"/>
                   <a:ea typeface="D2Coding" panose="020B0609020101020101" pitchFamily="49" charset="-127"/>
                 </a:rPr>
                 <a:t>/</a:t>
               </a:r>
               <a:r>
-                <a:rPr lang="en" altLang="ko-KR" sz="1400" dirty="0">
+                <a:rPr lang="en" altLang="ko-KR" sz="1400" b="1" u="sng" dirty="0">
                   <a:latin typeface="D2Coding" panose="020B0609020101020101" pitchFamily="49" charset="-127"/>
                   <a:ea typeface="D2Coding" panose="020B0609020101020101" pitchFamily="49" charset="-127"/>
                 </a:rPr>
                 <a:t>EC</a:t>
               </a:r>
-              <a:endParaRPr lang="ko-KR" altLang="en-US" sz="1400" dirty="0">
+              <a:endParaRPr lang="ko-KR" altLang="en-US" sz="1400" b="1" u="sng" dirty="0">
                 <a:latin typeface="D2Coding" panose="020B0609020101020101" pitchFamily="49" charset="-127"/>
                 <a:ea typeface="D2Coding" panose="020B0609020101020101" pitchFamily="49" charset="-127"/>
               </a:endParaRPr>
@@ -10455,20 +10455,20 @@
             <a:p>
               <a:pPr algn="ctr"/>
               <a:r>
-                <a:rPr lang="ko-KR" altLang="en-US" sz="1400" dirty="0">
+                <a:rPr lang="ko-KR" altLang="en-US" sz="1400" b="1" u="sng" dirty="0">
                   <a:latin typeface="D2Coding" panose="020B0609020101020101" pitchFamily="49" charset="-127"/>
                   <a:ea typeface="D2Coding" panose="020B0609020101020101" pitchFamily="49" charset="-127"/>
                 </a:rPr>
                 <a:t>여행</a:t>
               </a:r>
               <a:r>
-                <a:rPr lang="en-US" altLang="ko-KR" sz="1400" dirty="0">
+                <a:rPr lang="en-US" altLang="ko-KR" sz="1400" b="1" u="sng" dirty="0">
                   <a:latin typeface="D2Coding" panose="020B0609020101020101" pitchFamily="49" charset="-127"/>
                   <a:ea typeface="D2Coding" panose="020B0609020101020101" pitchFamily="49" charset="-127"/>
                 </a:rPr>
                 <a:t>/NNG</a:t>
               </a:r>
-              <a:endParaRPr lang="ko-KR" altLang="en-US" sz="1400" dirty="0">
+              <a:endParaRPr lang="ko-KR" altLang="en-US" sz="1400" b="1" u="sng" dirty="0">
                 <a:latin typeface="D2Coding" panose="020B0609020101020101" pitchFamily="49" charset="-127"/>
                 <a:ea typeface="D2Coding" panose="020B0609020101020101" pitchFamily="49" charset="-127"/>
               </a:endParaRPr>
@@ -10591,48 +10591,48 @@
             <a:p>
               <a:pPr algn="ctr"/>
               <a:r>
-                <a:rPr lang="ko-KR" altLang="en-US" sz="1400" dirty="0">
+                <a:rPr lang="ko-KR" altLang="en-US" sz="1400" b="1" u="sng" dirty="0">
                   <a:latin typeface="D2Coding" panose="020B0609020101020101" pitchFamily="49" charset="-127"/>
                   <a:ea typeface="D2Coding" panose="020B0609020101020101" pitchFamily="49" charset="-127"/>
                 </a:rPr>
                 <a:t>가</a:t>
               </a:r>
               <a:r>
-                <a:rPr lang="en-US" altLang="ko-KR" sz="1400" dirty="0">
+                <a:rPr lang="en-US" altLang="ko-KR" sz="1400" b="1" u="sng" dirty="0">
                   <a:latin typeface="D2Coding" panose="020B0609020101020101" pitchFamily="49" charset="-127"/>
                   <a:ea typeface="D2Coding" panose="020B0609020101020101" pitchFamily="49" charset="-127"/>
                 </a:rPr>
                 <a:t>/</a:t>
               </a:r>
               <a:r>
-                <a:rPr lang="en" altLang="ko-KR" sz="1400" dirty="0">
+                <a:rPr lang="en" altLang="ko-KR" sz="1400" b="1" u="sng" dirty="0">
                   <a:latin typeface="D2Coding" panose="020B0609020101020101" pitchFamily="49" charset="-127"/>
                   <a:ea typeface="D2Coding" panose="020B0609020101020101" pitchFamily="49" charset="-127"/>
                 </a:rPr>
                 <a:t>VV+</a:t>
               </a:r>
               <a:r>
-                <a:rPr lang="ko-KR" altLang="en-US" sz="1400" dirty="0" err="1">
+                <a:rPr lang="ko-KR" altLang="en-US" sz="1400" b="1" u="sng" dirty="0" err="1">
                   <a:latin typeface="D2Coding" panose="020B0609020101020101" pitchFamily="49" charset="-127"/>
                   <a:ea typeface="D2Coding" panose="020B0609020101020101" pitchFamily="49" charset="-127"/>
                 </a:rPr>
                 <a:t>았</a:t>
               </a:r>
               <a:r>
-                <a:rPr lang="en-US" altLang="ko-KR" sz="1400" dirty="0">
+                <a:rPr lang="en-US" altLang="ko-KR" sz="1400" b="1" u="sng" dirty="0">
                   <a:latin typeface="D2Coding" panose="020B0609020101020101" pitchFamily="49" charset="-127"/>
                   <a:ea typeface="D2Coding" panose="020B0609020101020101" pitchFamily="49" charset="-127"/>
                 </a:rPr>
                 <a:t>/</a:t>
               </a:r>
               <a:r>
-                <a:rPr lang="en" altLang="ko-KR" sz="1400" dirty="0">
+                <a:rPr lang="en" altLang="ko-KR" sz="1400" b="1" u="sng" dirty="0">
                   <a:latin typeface="D2Coding" panose="020B0609020101020101" pitchFamily="49" charset="-127"/>
                   <a:ea typeface="D2Coding" panose="020B0609020101020101" pitchFamily="49" charset="-127"/>
                 </a:rPr>
                 <a:t>EP</a:t>
               </a:r>
-              <a:endParaRPr lang="ko-KR" altLang="en-US" sz="1400" dirty="0">
+              <a:endParaRPr lang="ko-KR" altLang="en-US" sz="1400" b="1" u="sng" dirty="0">
                 <a:latin typeface="D2Coding" panose="020B0609020101020101" pitchFamily="49" charset="-127"/>
                 <a:ea typeface="D2Coding" panose="020B0609020101020101" pitchFamily="49" charset="-127"/>
               </a:endParaRPr>
@@ -10687,20 +10687,20 @@
             <a:p>
               <a:pPr algn="ctr"/>
               <a:r>
-                <a:rPr lang="ko-KR" altLang="en-US" sz="1400" dirty="0">
+                <a:rPr lang="ko-KR" altLang="en-US" sz="1400" b="1" u="sng" dirty="0">
                   <a:latin typeface="D2Coding" panose="020B0609020101020101" pitchFamily="49" charset="-127"/>
                   <a:ea typeface="D2Coding" panose="020B0609020101020101" pitchFamily="49" charset="-127"/>
                 </a:rPr>
                 <a:t>다</a:t>
               </a:r>
               <a:r>
-                <a:rPr lang="en-US" altLang="ko-KR" sz="1400" dirty="0">
+                <a:rPr lang="en-US" altLang="ko-KR" sz="1400" b="1" u="sng" dirty="0">
                   <a:latin typeface="D2Coding" panose="020B0609020101020101" pitchFamily="49" charset="-127"/>
                   <a:ea typeface="D2Coding" panose="020B0609020101020101" pitchFamily="49" charset="-127"/>
                 </a:rPr>
                 <a:t>/EC</a:t>
               </a:r>
-              <a:endParaRPr lang="ko-KR" altLang="en-US" sz="1400" dirty="0">
+              <a:endParaRPr lang="ko-KR" altLang="en-US" sz="1400" b="1" u="sng" dirty="0">
                 <a:latin typeface="D2Coding" panose="020B0609020101020101" pitchFamily="49" charset="-127"/>
                 <a:ea typeface="D2Coding" panose="020B0609020101020101" pitchFamily="49" charset="-127"/>
               </a:endParaRPr>
@@ -10755,48 +10755,48 @@
             <a:p>
               <a:pPr algn="ctr"/>
               <a:r>
-                <a:rPr lang="ko-KR" altLang="en-US" sz="1400" dirty="0">
+                <a:rPr lang="ko-KR" altLang="en-US" sz="1400" b="1" u="sng" dirty="0">
                   <a:latin typeface="D2Coding" panose="020B0609020101020101" pitchFamily="49" charset="-127"/>
                   <a:ea typeface="D2Coding" panose="020B0609020101020101" pitchFamily="49" charset="-127"/>
                 </a:rPr>
                 <a:t>오</a:t>
               </a:r>
               <a:r>
-                <a:rPr lang="en-US" altLang="ko-KR" sz="1400" dirty="0">
+                <a:rPr lang="en-US" altLang="ko-KR" sz="1400" b="1" u="sng" dirty="0">
                   <a:latin typeface="D2Coding" panose="020B0609020101020101" pitchFamily="49" charset="-127"/>
                   <a:ea typeface="D2Coding" panose="020B0609020101020101" pitchFamily="49" charset="-127"/>
                 </a:rPr>
                 <a:t>/</a:t>
               </a:r>
               <a:r>
-                <a:rPr lang="en" altLang="ko-KR" sz="1400" dirty="0">
+                <a:rPr lang="en" altLang="ko-KR" sz="1400" b="1" u="sng" dirty="0">
                   <a:latin typeface="D2Coding" panose="020B0609020101020101" pitchFamily="49" charset="-127"/>
                   <a:ea typeface="D2Coding" panose="020B0609020101020101" pitchFamily="49" charset="-127"/>
                 </a:rPr>
                 <a:t>VX+</a:t>
               </a:r>
               <a:r>
-                <a:rPr lang="ko-KR" altLang="en-US" sz="1400" dirty="0" err="1">
+                <a:rPr lang="ko-KR" altLang="en-US" sz="1400" b="1" u="sng" dirty="0" err="1">
                   <a:latin typeface="D2Coding" panose="020B0609020101020101" pitchFamily="49" charset="-127"/>
                   <a:ea typeface="D2Coding" panose="020B0609020101020101" pitchFamily="49" charset="-127"/>
                 </a:rPr>
                 <a:t>았</a:t>
               </a:r>
               <a:r>
-                <a:rPr lang="en-US" altLang="ko-KR" sz="1400" dirty="0">
+                <a:rPr lang="en-US" altLang="ko-KR" sz="1400" b="1" u="sng" dirty="0">
                   <a:latin typeface="D2Coding" panose="020B0609020101020101" pitchFamily="49" charset="-127"/>
                   <a:ea typeface="D2Coding" panose="020B0609020101020101" pitchFamily="49" charset="-127"/>
                 </a:rPr>
                 <a:t>/</a:t>
               </a:r>
               <a:r>
-                <a:rPr lang="en" altLang="ko-KR" sz="1400" dirty="0">
+                <a:rPr lang="en" altLang="ko-KR" sz="1400" b="1" u="sng" dirty="0">
                   <a:latin typeface="D2Coding" panose="020B0609020101020101" pitchFamily="49" charset="-127"/>
                   <a:ea typeface="D2Coding" panose="020B0609020101020101" pitchFamily="49" charset="-127"/>
                 </a:rPr>
                 <a:t>EP</a:t>
               </a:r>
-              <a:endParaRPr lang="ko-KR" altLang="en-US" sz="1400" dirty="0">
+              <a:endParaRPr lang="ko-KR" altLang="en-US" sz="1400" b="1" u="sng" dirty="0">
                 <a:latin typeface="D2Coding" panose="020B0609020101020101" pitchFamily="49" charset="-127"/>
                 <a:ea typeface="D2Coding" panose="020B0609020101020101" pitchFamily="49" charset="-127"/>
               </a:endParaRPr>
@@ -10919,48 +10919,48 @@
             <a:p>
               <a:pPr algn="ctr"/>
               <a:r>
-                <a:rPr lang="ko-KR" altLang="en-US" sz="1400" dirty="0">
+                <a:rPr lang="ko-KR" altLang="en-US" sz="1400" b="1" u="sng" dirty="0">
                   <a:latin typeface="D2Coding" panose="020B0609020101020101" pitchFamily="49" charset="-127"/>
                   <a:ea typeface="D2Coding" panose="020B0609020101020101" pitchFamily="49" charset="-127"/>
                 </a:rPr>
                 <a:t>보</a:t>
               </a:r>
               <a:r>
-                <a:rPr lang="en-US" altLang="ko-KR" sz="1400" dirty="0">
+                <a:rPr lang="en-US" altLang="ko-KR" sz="1400" b="1" u="sng" dirty="0">
                   <a:latin typeface="D2Coding" panose="020B0609020101020101" pitchFamily="49" charset="-127"/>
                   <a:ea typeface="D2Coding" panose="020B0609020101020101" pitchFamily="49" charset="-127"/>
                 </a:rPr>
                 <a:t>/</a:t>
               </a:r>
               <a:r>
-                <a:rPr lang="en" altLang="ko-KR" sz="1400" dirty="0">
+                <a:rPr lang="en" altLang="ko-KR" sz="1400" b="1" u="sng" dirty="0">
                   <a:latin typeface="D2Coding" panose="020B0609020101020101" pitchFamily="49" charset="-127"/>
                   <a:ea typeface="D2Coding" panose="020B0609020101020101" pitchFamily="49" charset="-127"/>
                 </a:rPr>
                 <a:t>VX+</a:t>
               </a:r>
               <a:r>
-                <a:rPr lang="ko-KR" altLang="en-US" sz="1400" dirty="0">
+                <a:rPr lang="ko-KR" altLang="en-US" sz="1400" b="1" u="sng" dirty="0">
                   <a:latin typeface="D2Coding" panose="020B0609020101020101" pitchFamily="49" charset="-127"/>
                   <a:ea typeface="D2Coding" panose="020B0609020101020101" pitchFamily="49" charset="-127"/>
                 </a:rPr>
                 <a:t>아</a:t>
               </a:r>
               <a:r>
-                <a:rPr lang="en-US" altLang="ko-KR" sz="1400" dirty="0">
+                <a:rPr lang="en-US" altLang="ko-KR" sz="1400" b="1" u="sng" dirty="0">
                   <a:latin typeface="D2Coding" panose="020B0609020101020101" pitchFamily="49" charset="-127"/>
                   <a:ea typeface="D2Coding" panose="020B0609020101020101" pitchFamily="49" charset="-127"/>
                 </a:rPr>
                 <a:t>/</a:t>
               </a:r>
               <a:r>
-                <a:rPr lang="en" altLang="ko-KR" sz="1400" dirty="0">
+                <a:rPr lang="en" altLang="ko-KR" sz="1400" b="1" u="sng" dirty="0">
                   <a:latin typeface="D2Coding" panose="020B0609020101020101" pitchFamily="49" charset="-127"/>
                   <a:ea typeface="D2Coding" panose="020B0609020101020101" pitchFamily="49" charset="-127"/>
                 </a:rPr>
                 <a:t>EC</a:t>
               </a:r>
-              <a:endParaRPr lang="ko-KR" altLang="en-US" sz="1400" dirty="0">
+              <a:endParaRPr lang="ko-KR" altLang="en-US" sz="1400" b="1" u="sng" dirty="0">
                 <a:latin typeface="D2Coding" panose="020B0609020101020101" pitchFamily="49" charset="-127"/>
                 <a:ea typeface="D2Coding" panose="020B0609020101020101" pitchFamily="49" charset="-127"/>
               </a:endParaRPr>
@@ -11690,20 +11690,20 @@
             <a:p>
               <a:pPr algn="ctr"/>
               <a:r>
-                <a:rPr lang="ko-KR" altLang="en-US" sz="1400" dirty="0">
+                <a:rPr lang="ko-KR" altLang="en-US" sz="1400" b="1" u="sng" dirty="0">
                   <a:latin typeface="D2Coding" panose="020B0609020101020101" pitchFamily="49" charset="-127"/>
                   <a:ea typeface="D2Coding" panose="020B0609020101020101" pitchFamily="49" charset="-127"/>
                 </a:rPr>
                 <a:t>여행</a:t>
               </a:r>
               <a:r>
-                <a:rPr lang="en-US" altLang="ko-KR" sz="1400" dirty="0">
+                <a:rPr lang="en-US" altLang="ko-KR" sz="1400" b="1" u="sng" dirty="0">
                   <a:latin typeface="D2Coding" panose="020B0609020101020101" pitchFamily="49" charset="-127"/>
                   <a:ea typeface="D2Coding" panose="020B0609020101020101" pitchFamily="49" charset="-127"/>
                 </a:rPr>
                 <a:t>/NNG</a:t>
               </a:r>
-              <a:endParaRPr lang="ko-KR" altLang="en-US" sz="1400" dirty="0">
+              <a:endParaRPr lang="ko-KR" altLang="en-US" sz="1400" b="1" u="sng" dirty="0">
                 <a:latin typeface="D2Coding" panose="020B0609020101020101" pitchFamily="49" charset="-127"/>
                 <a:ea typeface="D2Coding" panose="020B0609020101020101" pitchFamily="49" charset="-127"/>
               </a:endParaRPr>
@@ -11758,20 +11758,20 @@
             <a:p>
               <a:pPr algn="ctr"/>
               <a:r>
-                <a:rPr lang="ko-KR" altLang="en-US" sz="1400" dirty="0">
+                <a:rPr lang="ko-KR" altLang="en-US" sz="1400" b="1" u="sng" dirty="0">
                   <a:latin typeface="D2Coding" panose="020B0609020101020101" pitchFamily="49" charset="-127"/>
                   <a:ea typeface="D2Coding" panose="020B0609020101020101" pitchFamily="49" charset="-127"/>
                 </a:rPr>
                 <a:t>을</a:t>
               </a:r>
               <a:r>
-                <a:rPr lang="en-US" altLang="ko-KR" sz="1400" dirty="0">
+                <a:rPr lang="en-US" altLang="ko-KR" sz="1400" b="1" u="sng" dirty="0">
                   <a:latin typeface="D2Coding" panose="020B0609020101020101" pitchFamily="49" charset="-127"/>
                   <a:ea typeface="D2Coding" panose="020B0609020101020101" pitchFamily="49" charset="-127"/>
                 </a:rPr>
                 <a:t>/JKO</a:t>
               </a:r>
-              <a:endParaRPr lang="ko-KR" altLang="en-US" sz="1400" dirty="0">
+              <a:endParaRPr lang="ko-KR" altLang="en-US" sz="1400" b="1" u="sng" dirty="0">
                 <a:latin typeface="D2Coding" panose="020B0609020101020101" pitchFamily="49" charset="-127"/>
                 <a:ea typeface="D2Coding" panose="020B0609020101020101" pitchFamily="49" charset="-127"/>
               </a:endParaRPr>
@@ -11826,48 +11826,48 @@
             <a:p>
               <a:pPr algn="ctr"/>
               <a:r>
-                <a:rPr lang="ko-KR" altLang="en-US" sz="1400" dirty="0">
+                <a:rPr lang="ko-KR" altLang="en-US" sz="1400" b="1" u="sng" dirty="0">
                   <a:latin typeface="D2Coding" panose="020B0609020101020101" pitchFamily="49" charset="-127"/>
                   <a:ea typeface="D2Coding" panose="020B0609020101020101" pitchFamily="49" charset="-127"/>
                 </a:rPr>
                 <a:t>가</a:t>
               </a:r>
               <a:r>
-                <a:rPr lang="en-US" altLang="ko-KR" sz="1400" dirty="0">
+                <a:rPr lang="en-US" altLang="ko-KR" sz="1400" b="1" u="sng" dirty="0">
                   <a:latin typeface="D2Coding" panose="020B0609020101020101" pitchFamily="49" charset="-127"/>
                   <a:ea typeface="D2Coding" panose="020B0609020101020101" pitchFamily="49" charset="-127"/>
                 </a:rPr>
                 <a:t>/</a:t>
               </a:r>
               <a:r>
-                <a:rPr lang="en" altLang="ko-KR" sz="1400" dirty="0">
+                <a:rPr lang="en" altLang="ko-KR" sz="1400" b="1" u="sng" dirty="0">
                   <a:latin typeface="D2Coding" panose="020B0609020101020101" pitchFamily="49" charset="-127"/>
                   <a:ea typeface="D2Coding" panose="020B0609020101020101" pitchFamily="49" charset="-127"/>
                 </a:rPr>
                 <a:t>VV+</a:t>
               </a:r>
               <a:r>
-                <a:rPr lang="ko-KR" altLang="en-US" sz="1400" dirty="0" err="1">
+                <a:rPr lang="ko-KR" altLang="en-US" sz="1400" b="1" u="sng" dirty="0" err="1">
                   <a:latin typeface="D2Coding" panose="020B0609020101020101" pitchFamily="49" charset="-127"/>
                   <a:ea typeface="D2Coding" panose="020B0609020101020101" pitchFamily="49" charset="-127"/>
                 </a:rPr>
                 <a:t>았</a:t>
               </a:r>
               <a:r>
-                <a:rPr lang="en-US" altLang="ko-KR" sz="1400" dirty="0">
+                <a:rPr lang="en-US" altLang="ko-KR" sz="1400" b="1" u="sng" dirty="0">
                   <a:latin typeface="D2Coding" panose="020B0609020101020101" pitchFamily="49" charset="-127"/>
                   <a:ea typeface="D2Coding" panose="020B0609020101020101" pitchFamily="49" charset="-127"/>
                 </a:rPr>
                 <a:t>/</a:t>
               </a:r>
               <a:r>
-                <a:rPr lang="en" altLang="ko-KR" sz="1400" dirty="0">
+                <a:rPr lang="en" altLang="ko-KR" sz="1400" b="1" u="sng" dirty="0">
                   <a:latin typeface="D2Coding" panose="020B0609020101020101" pitchFamily="49" charset="-127"/>
                   <a:ea typeface="D2Coding" panose="020B0609020101020101" pitchFamily="49" charset="-127"/>
                 </a:rPr>
                 <a:t>EP</a:t>
               </a:r>
-              <a:endParaRPr lang="ko-KR" altLang="en-US" sz="1400" dirty="0">
+              <a:endParaRPr lang="ko-KR" altLang="en-US" sz="1400" b="1" u="sng" dirty="0">
                 <a:latin typeface="D2Coding" panose="020B0609020101020101" pitchFamily="49" charset="-127"/>
                 <a:ea typeface="D2Coding" panose="020B0609020101020101" pitchFamily="49" charset="-127"/>
               </a:endParaRPr>
@@ -11922,20 +11922,20 @@
             <a:p>
               <a:pPr algn="ctr"/>
               <a:r>
-                <a:rPr lang="ko-KR" altLang="en-US" sz="1400" dirty="0">
+                <a:rPr lang="ko-KR" altLang="en-US" sz="1400" b="1" u="sng" dirty="0">
                   <a:latin typeface="D2Coding" panose="020B0609020101020101" pitchFamily="49" charset="-127"/>
                   <a:ea typeface="D2Coding" panose="020B0609020101020101" pitchFamily="49" charset="-127"/>
                 </a:rPr>
                 <a:t>다</a:t>
               </a:r>
               <a:r>
-                <a:rPr lang="en-US" altLang="ko-KR" sz="1400" dirty="0">
+                <a:rPr lang="en-US" altLang="ko-KR" sz="1400" b="1" u="sng" dirty="0">
                   <a:latin typeface="D2Coding" panose="020B0609020101020101" pitchFamily="49" charset="-127"/>
                   <a:ea typeface="D2Coding" panose="020B0609020101020101" pitchFamily="49" charset="-127"/>
                 </a:rPr>
                 <a:t>/EC</a:t>
               </a:r>
-              <a:endParaRPr lang="ko-KR" altLang="en-US" sz="1400" dirty="0">
+              <a:endParaRPr lang="ko-KR" altLang="en-US" sz="1400" b="1" u="sng" dirty="0">
                 <a:latin typeface="D2Coding" panose="020B0609020101020101" pitchFamily="49" charset="-127"/>
                 <a:ea typeface="D2Coding" panose="020B0609020101020101" pitchFamily="49" charset="-127"/>
               </a:endParaRPr>
@@ -11990,48 +11990,48 @@
             <a:p>
               <a:pPr algn="ctr"/>
               <a:r>
-                <a:rPr lang="ko-KR" altLang="en-US" sz="1400" dirty="0">
+                <a:rPr lang="ko-KR" altLang="en-US" sz="1400" b="1" u="sng" dirty="0">
                   <a:latin typeface="D2Coding" panose="020B0609020101020101" pitchFamily="49" charset="-127"/>
                   <a:ea typeface="D2Coding" panose="020B0609020101020101" pitchFamily="49" charset="-127"/>
                 </a:rPr>
                 <a:t>오</a:t>
               </a:r>
               <a:r>
-                <a:rPr lang="en-US" altLang="ko-KR" sz="1400" dirty="0">
+                <a:rPr lang="en-US" altLang="ko-KR" sz="1400" b="1" u="sng" dirty="0">
                   <a:latin typeface="D2Coding" panose="020B0609020101020101" pitchFamily="49" charset="-127"/>
                   <a:ea typeface="D2Coding" panose="020B0609020101020101" pitchFamily="49" charset="-127"/>
                 </a:rPr>
                 <a:t>/</a:t>
               </a:r>
               <a:r>
-                <a:rPr lang="en" altLang="ko-KR" sz="1400" dirty="0">
+                <a:rPr lang="en" altLang="ko-KR" sz="1400" b="1" u="sng" dirty="0">
                   <a:latin typeface="D2Coding" panose="020B0609020101020101" pitchFamily="49" charset="-127"/>
                   <a:ea typeface="D2Coding" panose="020B0609020101020101" pitchFamily="49" charset="-127"/>
                 </a:rPr>
                 <a:t>VX+</a:t>
               </a:r>
               <a:r>
-                <a:rPr lang="ko-KR" altLang="en-US" sz="1400" dirty="0" err="1">
+                <a:rPr lang="ko-KR" altLang="en-US" sz="1400" b="1" u="sng" dirty="0" err="1">
                   <a:latin typeface="D2Coding" panose="020B0609020101020101" pitchFamily="49" charset="-127"/>
                   <a:ea typeface="D2Coding" panose="020B0609020101020101" pitchFamily="49" charset="-127"/>
                 </a:rPr>
                 <a:t>았</a:t>
               </a:r>
               <a:r>
-                <a:rPr lang="en-US" altLang="ko-KR" sz="1400" dirty="0">
+                <a:rPr lang="en-US" altLang="ko-KR" sz="1400" b="1" u="sng" dirty="0">
                   <a:latin typeface="D2Coding" panose="020B0609020101020101" pitchFamily="49" charset="-127"/>
                   <a:ea typeface="D2Coding" panose="020B0609020101020101" pitchFamily="49" charset="-127"/>
                 </a:rPr>
                 <a:t>/</a:t>
               </a:r>
               <a:r>
-                <a:rPr lang="en" altLang="ko-KR" sz="1400" dirty="0">
+                <a:rPr lang="en" altLang="ko-KR" sz="1400" b="1" u="sng" dirty="0">
                   <a:latin typeface="D2Coding" panose="020B0609020101020101" pitchFamily="49" charset="-127"/>
                   <a:ea typeface="D2Coding" panose="020B0609020101020101" pitchFamily="49" charset="-127"/>
                 </a:rPr>
                 <a:t>EP</a:t>
               </a:r>
-              <a:endParaRPr lang="ko-KR" altLang="en-US" sz="1400" dirty="0">
+              <a:endParaRPr lang="ko-KR" altLang="en-US" sz="1400" b="1" u="sng" dirty="0">
                 <a:latin typeface="D2Coding" panose="020B0609020101020101" pitchFamily="49" charset="-127"/>
                 <a:ea typeface="D2Coding" panose="020B0609020101020101" pitchFamily="49" charset="-127"/>
               </a:endParaRPr>
@@ -12154,48 +12154,48 @@
             <a:p>
               <a:pPr algn="ctr"/>
               <a:r>
-                <a:rPr lang="ko-KR" altLang="en-US" sz="1400" dirty="0">
+                <a:rPr lang="ko-KR" altLang="en-US" sz="1400" b="1" u="sng" dirty="0">
                   <a:latin typeface="D2Coding" panose="020B0609020101020101" pitchFamily="49" charset="-127"/>
                   <a:ea typeface="D2Coding" panose="020B0609020101020101" pitchFamily="49" charset="-127"/>
                 </a:rPr>
                 <a:t>보</a:t>
               </a:r>
               <a:r>
-                <a:rPr lang="en-US" altLang="ko-KR" sz="1400" dirty="0">
+                <a:rPr lang="en-US" altLang="ko-KR" sz="1400" b="1" u="sng" dirty="0">
                   <a:latin typeface="D2Coding" panose="020B0609020101020101" pitchFamily="49" charset="-127"/>
                   <a:ea typeface="D2Coding" panose="020B0609020101020101" pitchFamily="49" charset="-127"/>
                 </a:rPr>
                 <a:t>/</a:t>
               </a:r>
               <a:r>
-                <a:rPr lang="en" altLang="ko-KR" sz="1400" dirty="0">
+                <a:rPr lang="en" altLang="ko-KR" sz="1400" b="1" u="sng" dirty="0">
                   <a:latin typeface="D2Coding" panose="020B0609020101020101" pitchFamily="49" charset="-127"/>
                   <a:ea typeface="D2Coding" panose="020B0609020101020101" pitchFamily="49" charset="-127"/>
                 </a:rPr>
                 <a:t>VX+</a:t>
               </a:r>
               <a:r>
-                <a:rPr lang="ko-KR" altLang="en-US" sz="1400" dirty="0">
+                <a:rPr lang="ko-KR" altLang="en-US" sz="1400" b="1" u="sng" dirty="0">
                   <a:latin typeface="D2Coding" panose="020B0609020101020101" pitchFamily="49" charset="-127"/>
                   <a:ea typeface="D2Coding" panose="020B0609020101020101" pitchFamily="49" charset="-127"/>
                 </a:rPr>
                 <a:t>아</a:t>
               </a:r>
               <a:r>
-                <a:rPr lang="en-US" altLang="ko-KR" sz="1400" dirty="0">
+                <a:rPr lang="en-US" altLang="ko-KR" sz="1400" b="1" u="sng" dirty="0">
                   <a:latin typeface="D2Coding" panose="020B0609020101020101" pitchFamily="49" charset="-127"/>
                   <a:ea typeface="D2Coding" panose="020B0609020101020101" pitchFamily="49" charset="-127"/>
                 </a:rPr>
                 <a:t>/</a:t>
               </a:r>
               <a:r>
-                <a:rPr lang="en" altLang="ko-KR" sz="1400" dirty="0">
+                <a:rPr lang="en" altLang="ko-KR" sz="1400" b="1" u="sng" dirty="0">
                   <a:latin typeface="D2Coding" panose="020B0609020101020101" pitchFamily="49" charset="-127"/>
                   <a:ea typeface="D2Coding" panose="020B0609020101020101" pitchFamily="49" charset="-127"/>
                 </a:rPr>
                 <a:t>EC</a:t>
               </a:r>
-              <a:endParaRPr lang="ko-KR" altLang="en-US" sz="1400" dirty="0">
+              <a:endParaRPr lang="ko-KR" altLang="en-US" sz="1400" b="1" u="sng" dirty="0">
                 <a:latin typeface="D2Coding" panose="020B0609020101020101" pitchFamily="49" charset="-127"/>
                 <a:ea typeface="D2Coding" panose="020B0609020101020101" pitchFamily="49" charset="-127"/>
               </a:endParaRPr>
@@ -12916,20 +12916,20 @@
             <a:p>
               <a:pPr algn="ctr"/>
               <a:r>
-                <a:rPr lang="ko-KR" altLang="en-US" sz="1400" dirty="0">
+                <a:rPr lang="ko-KR" altLang="en-US" sz="1400" b="1" u="sng" dirty="0">
                   <a:latin typeface="D2Coding" panose="020B0609020101020101" pitchFamily="49" charset="-127"/>
                   <a:ea typeface="D2Coding" panose="020B0609020101020101" pitchFamily="49" charset="-127"/>
                 </a:rPr>
                 <a:t>여행</a:t>
               </a:r>
               <a:r>
-                <a:rPr lang="en-US" altLang="ko-KR" sz="1400" dirty="0">
+                <a:rPr lang="en-US" altLang="ko-KR" sz="1400" b="1" u="sng" dirty="0">
                   <a:latin typeface="D2Coding" panose="020B0609020101020101" pitchFamily="49" charset="-127"/>
                   <a:ea typeface="D2Coding" panose="020B0609020101020101" pitchFamily="49" charset="-127"/>
                 </a:rPr>
                 <a:t>/NNG</a:t>
               </a:r>
-              <a:endParaRPr lang="ko-KR" altLang="en-US" sz="1400" dirty="0">
+              <a:endParaRPr lang="ko-KR" altLang="en-US" sz="1400" b="1" u="sng" dirty="0">
                 <a:latin typeface="D2Coding" panose="020B0609020101020101" pitchFamily="49" charset="-127"/>
                 <a:ea typeface="D2Coding" panose="020B0609020101020101" pitchFamily="49" charset="-127"/>
               </a:endParaRPr>
@@ -12984,20 +12984,20 @@
             <a:p>
               <a:pPr algn="ctr"/>
               <a:r>
-                <a:rPr lang="ko-KR" altLang="en-US" sz="1400" dirty="0">
+                <a:rPr lang="ko-KR" altLang="en-US" sz="1400" b="1" u="sng" dirty="0">
                   <a:latin typeface="D2Coding" panose="020B0609020101020101" pitchFamily="49" charset="-127"/>
                   <a:ea typeface="D2Coding" panose="020B0609020101020101" pitchFamily="49" charset="-127"/>
                 </a:rPr>
                 <a:t>을</a:t>
               </a:r>
               <a:r>
-                <a:rPr lang="en-US" altLang="ko-KR" sz="1400" dirty="0">
+                <a:rPr lang="en-US" altLang="ko-KR" sz="1400" b="1" u="sng" dirty="0">
                   <a:latin typeface="D2Coding" panose="020B0609020101020101" pitchFamily="49" charset="-127"/>
                   <a:ea typeface="D2Coding" panose="020B0609020101020101" pitchFamily="49" charset="-127"/>
                 </a:rPr>
                 <a:t>/JKO</a:t>
               </a:r>
-              <a:endParaRPr lang="ko-KR" altLang="en-US" sz="1400" dirty="0">
+              <a:endParaRPr lang="ko-KR" altLang="en-US" sz="1400" b="1" u="sng" dirty="0">
                 <a:latin typeface="D2Coding" panose="020B0609020101020101" pitchFamily="49" charset="-127"/>
                 <a:ea typeface="D2Coding" panose="020B0609020101020101" pitchFamily="49" charset="-127"/>
               </a:endParaRPr>
@@ -13148,20 +13148,20 @@
             <a:p>
               <a:pPr algn="ctr"/>
               <a:r>
-                <a:rPr lang="ko-KR" altLang="en-US" sz="1400" dirty="0">
+                <a:rPr lang="ko-KR" altLang="en-US" sz="1400" b="1" u="sng" dirty="0">
                   <a:latin typeface="D2Coding" panose="020B0609020101020101" pitchFamily="49" charset="-127"/>
                   <a:ea typeface="D2Coding" panose="020B0609020101020101" pitchFamily="49" charset="-127"/>
                 </a:rPr>
                 <a:t>다</a:t>
               </a:r>
               <a:r>
-                <a:rPr lang="en-US" altLang="ko-KR" sz="1400" dirty="0">
+                <a:rPr lang="en-US" altLang="ko-KR" sz="1400" b="1" u="sng" dirty="0">
                   <a:latin typeface="D2Coding" panose="020B0609020101020101" pitchFamily="49" charset="-127"/>
                   <a:ea typeface="D2Coding" panose="020B0609020101020101" pitchFamily="49" charset="-127"/>
                 </a:rPr>
                 <a:t>/EC</a:t>
               </a:r>
-              <a:endParaRPr lang="ko-KR" altLang="en-US" sz="1400" dirty="0">
+              <a:endParaRPr lang="ko-KR" altLang="en-US" sz="1400" b="1" u="sng" dirty="0">
                 <a:latin typeface="D2Coding" panose="020B0609020101020101" pitchFamily="49" charset="-127"/>
                 <a:ea typeface="D2Coding" panose="020B0609020101020101" pitchFamily="49" charset="-127"/>
               </a:endParaRPr>
@@ -13216,48 +13216,48 @@
             <a:p>
               <a:pPr algn="ctr"/>
               <a:r>
-                <a:rPr lang="ko-KR" altLang="en-US" sz="1400" dirty="0">
+                <a:rPr lang="ko-KR" altLang="en-US" sz="1400" b="1" u="sng" dirty="0">
                   <a:latin typeface="D2Coding" panose="020B0609020101020101" pitchFamily="49" charset="-127"/>
                   <a:ea typeface="D2Coding" panose="020B0609020101020101" pitchFamily="49" charset="-127"/>
                 </a:rPr>
                 <a:t>오</a:t>
               </a:r>
               <a:r>
-                <a:rPr lang="en-US" altLang="ko-KR" sz="1400" dirty="0">
+                <a:rPr lang="en-US" altLang="ko-KR" sz="1400" b="1" u="sng" dirty="0">
                   <a:latin typeface="D2Coding" panose="020B0609020101020101" pitchFamily="49" charset="-127"/>
                   <a:ea typeface="D2Coding" panose="020B0609020101020101" pitchFamily="49" charset="-127"/>
                 </a:rPr>
                 <a:t>/</a:t>
               </a:r>
               <a:r>
-                <a:rPr lang="en" altLang="ko-KR" sz="1400" dirty="0">
+                <a:rPr lang="en" altLang="ko-KR" sz="1400" b="1" u="sng" dirty="0">
                   <a:latin typeface="D2Coding" panose="020B0609020101020101" pitchFamily="49" charset="-127"/>
                   <a:ea typeface="D2Coding" panose="020B0609020101020101" pitchFamily="49" charset="-127"/>
                 </a:rPr>
                 <a:t>VX+</a:t>
               </a:r>
               <a:r>
-                <a:rPr lang="ko-KR" altLang="en-US" sz="1400" dirty="0" err="1">
+                <a:rPr lang="ko-KR" altLang="en-US" sz="1400" b="1" u="sng" dirty="0" err="1">
                   <a:latin typeface="D2Coding" panose="020B0609020101020101" pitchFamily="49" charset="-127"/>
                   <a:ea typeface="D2Coding" panose="020B0609020101020101" pitchFamily="49" charset="-127"/>
                 </a:rPr>
                 <a:t>았</a:t>
               </a:r>
               <a:r>
-                <a:rPr lang="en-US" altLang="ko-KR" sz="1400" dirty="0">
+                <a:rPr lang="en-US" altLang="ko-KR" sz="1400" b="1" u="sng" dirty="0">
                   <a:latin typeface="D2Coding" panose="020B0609020101020101" pitchFamily="49" charset="-127"/>
                   <a:ea typeface="D2Coding" panose="020B0609020101020101" pitchFamily="49" charset="-127"/>
                 </a:rPr>
                 <a:t>/</a:t>
               </a:r>
               <a:r>
-                <a:rPr lang="en" altLang="ko-KR" sz="1400" dirty="0">
+                <a:rPr lang="en" altLang="ko-KR" sz="1400" b="1" u="sng" dirty="0">
                   <a:latin typeface="D2Coding" panose="020B0609020101020101" pitchFamily="49" charset="-127"/>
                   <a:ea typeface="D2Coding" panose="020B0609020101020101" pitchFamily="49" charset="-127"/>
                 </a:rPr>
                 <a:t>EP</a:t>
               </a:r>
-              <a:endParaRPr lang="ko-KR" altLang="en-US" sz="1400" dirty="0">
+              <a:endParaRPr lang="ko-KR" altLang="en-US" sz="1400" b="1" u="sng" dirty="0">
                 <a:latin typeface="D2Coding" panose="020B0609020101020101" pitchFamily="49" charset="-127"/>
                 <a:ea typeface="D2Coding" panose="020B0609020101020101" pitchFamily="49" charset="-127"/>
               </a:endParaRPr>
@@ -13380,48 +13380,48 @@
             <a:p>
               <a:pPr algn="ctr"/>
               <a:r>
-                <a:rPr lang="ko-KR" altLang="en-US" sz="1400" dirty="0">
+                <a:rPr lang="ko-KR" altLang="en-US" sz="1400" b="1" u="sng" dirty="0">
                   <a:latin typeface="D2Coding" panose="020B0609020101020101" pitchFamily="49" charset="-127"/>
                   <a:ea typeface="D2Coding" panose="020B0609020101020101" pitchFamily="49" charset="-127"/>
                 </a:rPr>
                 <a:t>보</a:t>
               </a:r>
               <a:r>
-                <a:rPr lang="en-US" altLang="ko-KR" sz="1400" dirty="0">
+                <a:rPr lang="en-US" altLang="ko-KR" sz="1400" b="1" u="sng" dirty="0">
                   <a:latin typeface="D2Coding" panose="020B0609020101020101" pitchFamily="49" charset="-127"/>
                   <a:ea typeface="D2Coding" panose="020B0609020101020101" pitchFamily="49" charset="-127"/>
                 </a:rPr>
                 <a:t>/</a:t>
               </a:r>
               <a:r>
-                <a:rPr lang="en" altLang="ko-KR" sz="1400" dirty="0">
+                <a:rPr lang="en" altLang="ko-KR" sz="1400" b="1" u="sng" dirty="0">
                   <a:latin typeface="D2Coding" panose="020B0609020101020101" pitchFamily="49" charset="-127"/>
                   <a:ea typeface="D2Coding" panose="020B0609020101020101" pitchFamily="49" charset="-127"/>
                 </a:rPr>
                 <a:t>VX+</a:t>
               </a:r>
               <a:r>
-                <a:rPr lang="ko-KR" altLang="en-US" sz="1400" dirty="0">
+                <a:rPr lang="ko-KR" altLang="en-US" sz="1400" b="1" u="sng" dirty="0">
                   <a:latin typeface="D2Coding" panose="020B0609020101020101" pitchFamily="49" charset="-127"/>
                   <a:ea typeface="D2Coding" panose="020B0609020101020101" pitchFamily="49" charset="-127"/>
                 </a:rPr>
                 <a:t>아</a:t>
               </a:r>
               <a:r>
-                <a:rPr lang="en-US" altLang="ko-KR" sz="1400" dirty="0">
+                <a:rPr lang="en-US" altLang="ko-KR" sz="1400" b="1" u="sng" dirty="0">
                   <a:latin typeface="D2Coding" panose="020B0609020101020101" pitchFamily="49" charset="-127"/>
                   <a:ea typeface="D2Coding" panose="020B0609020101020101" pitchFamily="49" charset="-127"/>
                 </a:rPr>
                 <a:t>/</a:t>
               </a:r>
               <a:r>
-                <a:rPr lang="en" altLang="ko-KR" sz="1400" dirty="0">
+                <a:rPr lang="en" altLang="ko-KR" sz="1400" b="1" u="sng" dirty="0">
                   <a:latin typeface="D2Coding" panose="020B0609020101020101" pitchFamily="49" charset="-127"/>
                   <a:ea typeface="D2Coding" panose="020B0609020101020101" pitchFamily="49" charset="-127"/>
                 </a:rPr>
                 <a:t>EC</a:t>
               </a:r>
-              <a:endParaRPr lang="ko-KR" altLang="en-US" sz="1400" dirty="0">
+              <a:endParaRPr lang="ko-KR" altLang="en-US" sz="1400" b="1" u="sng" dirty="0">
                 <a:latin typeface="D2Coding" panose="020B0609020101020101" pitchFamily="49" charset="-127"/>
                 <a:ea typeface="D2Coding" panose="020B0609020101020101" pitchFamily="49" charset="-127"/>
               </a:endParaRPr>
@@ -14152,20 +14152,20 @@
             <a:p>
               <a:pPr algn="ctr"/>
               <a:r>
-                <a:rPr lang="ko-KR" altLang="en-US" sz="1400" dirty="0">
+                <a:rPr lang="ko-KR" altLang="en-US" sz="1400" b="1" u="sng" dirty="0">
                   <a:latin typeface="D2Coding" panose="020B0609020101020101" pitchFamily="49" charset="-127"/>
                   <a:ea typeface="D2Coding" panose="020B0609020101020101" pitchFamily="49" charset="-127"/>
                 </a:rPr>
                 <a:t>여행</a:t>
               </a:r>
               <a:r>
-                <a:rPr lang="en-US" altLang="ko-KR" sz="1400" dirty="0">
+                <a:rPr lang="en-US" altLang="ko-KR" sz="1400" b="1" u="sng" dirty="0">
                   <a:latin typeface="D2Coding" panose="020B0609020101020101" pitchFamily="49" charset="-127"/>
                   <a:ea typeface="D2Coding" panose="020B0609020101020101" pitchFamily="49" charset="-127"/>
                 </a:rPr>
                 <a:t>/NNG</a:t>
               </a:r>
-              <a:endParaRPr lang="ko-KR" altLang="en-US" sz="1400" dirty="0">
+              <a:endParaRPr lang="ko-KR" altLang="en-US" sz="1400" b="1" u="sng" dirty="0">
                 <a:latin typeface="D2Coding" panose="020B0609020101020101" pitchFamily="49" charset="-127"/>
                 <a:ea typeface="D2Coding" panose="020B0609020101020101" pitchFamily="49" charset="-127"/>
               </a:endParaRPr>
@@ -14220,20 +14220,20 @@
             <a:p>
               <a:pPr algn="ctr"/>
               <a:r>
-                <a:rPr lang="ko-KR" altLang="en-US" sz="1400" dirty="0">
+                <a:rPr lang="ko-KR" altLang="en-US" sz="1400" b="1" u="sng" dirty="0">
                   <a:latin typeface="D2Coding" panose="020B0609020101020101" pitchFamily="49" charset="-127"/>
                   <a:ea typeface="D2Coding" panose="020B0609020101020101" pitchFamily="49" charset="-127"/>
                 </a:rPr>
                 <a:t>을</a:t>
               </a:r>
               <a:r>
-                <a:rPr lang="en-US" altLang="ko-KR" sz="1400" dirty="0">
+                <a:rPr lang="en-US" altLang="ko-KR" sz="1400" b="1" u="sng" dirty="0">
                   <a:latin typeface="D2Coding" panose="020B0609020101020101" pitchFamily="49" charset="-127"/>
                   <a:ea typeface="D2Coding" panose="020B0609020101020101" pitchFamily="49" charset="-127"/>
                 </a:rPr>
                 <a:t>/JKO</a:t>
               </a:r>
-              <a:endParaRPr lang="ko-KR" altLang="en-US" sz="1400" dirty="0">
+              <a:endParaRPr lang="ko-KR" altLang="en-US" sz="1400" b="1" u="sng" dirty="0">
                 <a:latin typeface="D2Coding" panose="020B0609020101020101" pitchFamily="49" charset="-127"/>
                 <a:ea typeface="D2Coding" panose="020B0609020101020101" pitchFamily="49" charset="-127"/>
               </a:endParaRPr>
@@ -14288,48 +14288,48 @@
             <a:p>
               <a:pPr algn="ctr"/>
               <a:r>
-                <a:rPr lang="ko-KR" altLang="en-US" sz="1400" dirty="0">
+                <a:rPr lang="ko-KR" altLang="en-US" sz="1400" b="1" u="sng" dirty="0">
                   <a:latin typeface="D2Coding" panose="020B0609020101020101" pitchFamily="49" charset="-127"/>
                   <a:ea typeface="D2Coding" panose="020B0609020101020101" pitchFamily="49" charset="-127"/>
                 </a:rPr>
                 <a:t>가</a:t>
               </a:r>
               <a:r>
-                <a:rPr lang="en-US" altLang="ko-KR" sz="1400" dirty="0">
+                <a:rPr lang="en-US" altLang="ko-KR" sz="1400" b="1" u="sng" dirty="0">
                   <a:latin typeface="D2Coding" panose="020B0609020101020101" pitchFamily="49" charset="-127"/>
                   <a:ea typeface="D2Coding" panose="020B0609020101020101" pitchFamily="49" charset="-127"/>
                 </a:rPr>
                 <a:t>/</a:t>
               </a:r>
               <a:r>
-                <a:rPr lang="en" altLang="ko-KR" sz="1400" dirty="0">
+                <a:rPr lang="en" altLang="ko-KR" sz="1400" b="1" u="sng" dirty="0">
                   <a:latin typeface="D2Coding" panose="020B0609020101020101" pitchFamily="49" charset="-127"/>
                   <a:ea typeface="D2Coding" panose="020B0609020101020101" pitchFamily="49" charset="-127"/>
                 </a:rPr>
                 <a:t>VV+</a:t>
               </a:r>
               <a:r>
-                <a:rPr lang="ko-KR" altLang="en-US" sz="1400" dirty="0" err="1">
+                <a:rPr lang="ko-KR" altLang="en-US" sz="1400" b="1" u="sng" dirty="0" err="1">
                   <a:latin typeface="D2Coding" panose="020B0609020101020101" pitchFamily="49" charset="-127"/>
                   <a:ea typeface="D2Coding" panose="020B0609020101020101" pitchFamily="49" charset="-127"/>
                 </a:rPr>
                 <a:t>았</a:t>
               </a:r>
               <a:r>
-                <a:rPr lang="en-US" altLang="ko-KR" sz="1400" dirty="0">
+                <a:rPr lang="en-US" altLang="ko-KR" sz="1400" b="1" u="sng" dirty="0">
                   <a:latin typeface="D2Coding" panose="020B0609020101020101" pitchFamily="49" charset="-127"/>
                   <a:ea typeface="D2Coding" panose="020B0609020101020101" pitchFamily="49" charset="-127"/>
                 </a:rPr>
                 <a:t>/</a:t>
               </a:r>
               <a:r>
-                <a:rPr lang="en" altLang="ko-KR" sz="1400" dirty="0">
+                <a:rPr lang="en" altLang="ko-KR" sz="1400" b="1" u="sng" dirty="0">
                   <a:latin typeface="D2Coding" panose="020B0609020101020101" pitchFamily="49" charset="-127"/>
                   <a:ea typeface="D2Coding" panose="020B0609020101020101" pitchFamily="49" charset="-127"/>
                 </a:rPr>
                 <a:t>EP</a:t>
               </a:r>
-              <a:endParaRPr lang="ko-KR" altLang="en-US" sz="1400" dirty="0">
+              <a:endParaRPr lang="ko-KR" altLang="en-US" sz="1400" b="1" u="sng" dirty="0">
                 <a:latin typeface="D2Coding" panose="020B0609020101020101" pitchFamily="49" charset="-127"/>
                 <a:ea typeface="D2Coding" panose="020B0609020101020101" pitchFamily="49" charset="-127"/>
               </a:endParaRPr>
@@ -14452,48 +14452,48 @@
             <a:p>
               <a:pPr algn="ctr"/>
               <a:r>
-                <a:rPr lang="ko-KR" altLang="en-US" sz="1400" dirty="0">
+                <a:rPr lang="ko-KR" altLang="en-US" sz="1400" b="1" u="sng" dirty="0">
                   <a:latin typeface="D2Coding" panose="020B0609020101020101" pitchFamily="49" charset="-127"/>
                   <a:ea typeface="D2Coding" panose="020B0609020101020101" pitchFamily="49" charset="-127"/>
                 </a:rPr>
                 <a:t>오</a:t>
               </a:r>
               <a:r>
-                <a:rPr lang="en-US" altLang="ko-KR" sz="1400" dirty="0">
+                <a:rPr lang="en-US" altLang="ko-KR" sz="1400" b="1" u="sng" dirty="0">
                   <a:latin typeface="D2Coding" panose="020B0609020101020101" pitchFamily="49" charset="-127"/>
                   <a:ea typeface="D2Coding" panose="020B0609020101020101" pitchFamily="49" charset="-127"/>
                 </a:rPr>
                 <a:t>/</a:t>
               </a:r>
               <a:r>
-                <a:rPr lang="en" altLang="ko-KR" sz="1400" dirty="0">
+                <a:rPr lang="en" altLang="ko-KR" sz="1400" b="1" u="sng" dirty="0">
                   <a:latin typeface="D2Coding" panose="020B0609020101020101" pitchFamily="49" charset="-127"/>
                   <a:ea typeface="D2Coding" panose="020B0609020101020101" pitchFamily="49" charset="-127"/>
                 </a:rPr>
                 <a:t>VX+</a:t>
               </a:r>
               <a:r>
-                <a:rPr lang="ko-KR" altLang="en-US" sz="1400" dirty="0" err="1">
+                <a:rPr lang="ko-KR" altLang="en-US" sz="1400" b="1" u="sng" dirty="0" err="1">
                   <a:latin typeface="D2Coding" panose="020B0609020101020101" pitchFamily="49" charset="-127"/>
                   <a:ea typeface="D2Coding" panose="020B0609020101020101" pitchFamily="49" charset="-127"/>
                 </a:rPr>
                 <a:t>았</a:t>
               </a:r>
               <a:r>
-                <a:rPr lang="en-US" altLang="ko-KR" sz="1400" dirty="0">
+                <a:rPr lang="en-US" altLang="ko-KR" sz="1400" b="1" u="sng" dirty="0">
                   <a:latin typeface="D2Coding" panose="020B0609020101020101" pitchFamily="49" charset="-127"/>
                   <a:ea typeface="D2Coding" panose="020B0609020101020101" pitchFamily="49" charset="-127"/>
                 </a:rPr>
                 <a:t>/</a:t>
               </a:r>
               <a:r>
-                <a:rPr lang="en" altLang="ko-KR" sz="1400" dirty="0">
+                <a:rPr lang="en" altLang="ko-KR" sz="1400" b="1" u="sng" dirty="0">
                   <a:latin typeface="D2Coding" panose="020B0609020101020101" pitchFamily="49" charset="-127"/>
                   <a:ea typeface="D2Coding" panose="020B0609020101020101" pitchFamily="49" charset="-127"/>
                 </a:rPr>
                 <a:t>EP</a:t>
               </a:r>
-              <a:endParaRPr lang="ko-KR" altLang="en-US" sz="1400" dirty="0">
+              <a:endParaRPr lang="ko-KR" altLang="en-US" sz="1400" b="1" u="sng" dirty="0">
                 <a:latin typeface="D2Coding" panose="020B0609020101020101" pitchFamily="49" charset="-127"/>
                 <a:ea typeface="D2Coding" panose="020B0609020101020101" pitchFamily="49" charset="-127"/>
               </a:endParaRPr>
@@ -14616,48 +14616,48 @@
             <a:p>
               <a:pPr algn="ctr"/>
               <a:r>
-                <a:rPr lang="ko-KR" altLang="en-US" sz="1400" dirty="0">
+                <a:rPr lang="ko-KR" altLang="en-US" sz="1400" b="1" u="sng" dirty="0">
                   <a:latin typeface="D2Coding" panose="020B0609020101020101" pitchFamily="49" charset="-127"/>
                   <a:ea typeface="D2Coding" panose="020B0609020101020101" pitchFamily="49" charset="-127"/>
                 </a:rPr>
                 <a:t>보</a:t>
               </a:r>
               <a:r>
-                <a:rPr lang="en-US" altLang="ko-KR" sz="1400" dirty="0">
+                <a:rPr lang="en-US" altLang="ko-KR" sz="1400" b="1" u="sng" dirty="0">
                   <a:latin typeface="D2Coding" panose="020B0609020101020101" pitchFamily="49" charset="-127"/>
                   <a:ea typeface="D2Coding" panose="020B0609020101020101" pitchFamily="49" charset="-127"/>
                 </a:rPr>
                 <a:t>/</a:t>
               </a:r>
               <a:r>
-                <a:rPr lang="en" altLang="ko-KR" sz="1400" dirty="0">
+                <a:rPr lang="en" altLang="ko-KR" sz="1400" b="1" u="sng" dirty="0">
                   <a:latin typeface="D2Coding" panose="020B0609020101020101" pitchFamily="49" charset="-127"/>
                   <a:ea typeface="D2Coding" panose="020B0609020101020101" pitchFamily="49" charset="-127"/>
                 </a:rPr>
                 <a:t>VX+</a:t>
               </a:r>
               <a:r>
-                <a:rPr lang="ko-KR" altLang="en-US" sz="1400" dirty="0">
+                <a:rPr lang="ko-KR" altLang="en-US" sz="1400" b="1" u="sng" dirty="0">
                   <a:latin typeface="D2Coding" panose="020B0609020101020101" pitchFamily="49" charset="-127"/>
                   <a:ea typeface="D2Coding" panose="020B0609020101020101" pitchFamily="49" charset="-127"/>
                 </a:rPr>
                 <a:t>아</a:t>
               </a:r>
               <a:r>
-                <a:rPr lang="en-US" altLang="ko-KR" sz="1400" dirty="0">
+                <a:rPr lang="en-US" altLang="ko-KR" sz="1400" b="1" u="sng" dirty="0">
                   <a:latin typeface="D2Coding" panose="020B0609020101020101" pitchFamily="49" charset="-127"/>
                   <a:ea typeface="D2Coding" panose="020B0609020101020101" pitchFamily="49" charset="-127"/>
                 </a:rPr>
                 <a:t>/</a:t>
               </a:r>
               <a:r>
-                <a:rPr lang="en" altLang="ko-KR" sz="1400" dirty="0">
+                <a:rPr lang="en" altLang="ko-KR" sz="1400" b="1" u="sng" dirty="0">
                   <a:latin typeface="D2Coding" panose="020B0609020101020101" pitchFamily="49" charset="-127"/>
                   <a:ea typeface="D2Coding" panose="020B0609020101020101" pitchFamily="49" charset="-127"/>
                 </a:rPr>
                 <a:t>EC</a:t>
               </a:r>
-              <a:endParaRPr lang="ko-KR" altLang="en-US" sz="1400" dirty="0">
+              <a:endParaRPr lang="ko-KR" altLang="en-US" sz="1400" b="1" u="sng" dirty="0">
                 <a:latin typeface="D2Coding" panose="020B0609020101020101" pitchFamily="49" charset="-127"/>
                 <a:ea typeface="D2Coding" panose="020B0609020101020101" pitchFamily="49" charset="-127"/>
               </a:endParaRPr>
@@ -15388,20 +15388,20 @@
             <a:p>
               <a:pPr algn="ctr"/>
               <a:r>
-                <a:rPr lang="ko-KR" altLang="en-US" sz="1400" dirty="0">
+                <a:rPr lang="ko-KR" altLang="en-US" sz="1400" b="1" u="sng" dirty="0">
                   <a:latin typeface="D2Coding" panose="020B0609020101020101" pitchFamily="49" charset="-127"/>
                   <a:ea typeface="D2Coding" panose="020B0609020101020101" pitchFamily="49" charset="-127"/>
                 </a:rPr>
                 <a:t>여행</a:t>
               </a:r>
               <a:r>
-                <a:rPr lang="en-US" altLang="ko-KR" sz="1400" dirty="0">
+                <a:rPr lang="en-US" altLang="ko-KR" sz="1400" b="1" u="sng" dirty="0">
                   <a:latin typeface="D2Coding" panose="020B0609020101020101" pitchFamily="49" charset="-127"/>
                   <a:ea typeface="D2Coding" panose="020B0609020101020101" pitchFamily="49" charset="-127"/>
                 </a:rPr>
                 <a:t>/NNG</a:t>
               </a:r>
-              <a:endParaRPr lang="ko-KR" altLang="en-US" sz="1400" dirty="0">
+              <a:endParaRPr lang="ko-KR" altLang="en-US" sz="1400" b="1" u="sng" dirty="0">
                 <a:latin typeface="D2Coding" panose="020B0609020101020101" pitchFamily="49" charset="-127"/>
                 <a:ea typeface="D2Coding" panose="020B0609020101020101" pitchFamily="49" charset="-127"/>
               </a:endParaRPr>
@@ -15456,20 +15456,20 @@
             <a:p>
               <a:pPr algn="ctr"/>
               <a:r>
-                <a:rPr lang="ko-KR" altLang="en-US" sz="1400" dirty="0">
+                <a:rPr lang="ko-KR" altLang="en-US" sz="1400" b="1" u="sng" dirty="0">
                   <a:latin typeface="D2Coding" panose="020B0609020101020101" pitchFamily="49" charset="-127"/>
                   <a:ea typeface="D2Coding" panose="020B0609020101020101" pitchFamily="49" charset="-127"/>
                 </a:rPr>
                 <a:t>을</a:t>
               </a:r>
               <a:r>
-                <a:rPr lang="en-US" altLang="ko-KR" sz="1400" dirty="0">
+                <a:rPr lang="en-US" altLang="ko-KR" sz="1400" b="1" u="sng" dirty="0">
                   <a:latin typeface="D2Coding" panose="020B0609020101020101" pitchFamily="49" charset="-127"/>
                   <a:ea typeface="D2Coding" panose="020B0609020101020101" pitchFamily="49" charset="-127"/>
                 </a:rPr>
                 <a:t>/JKO</a:t>
               </a:r>
-              <a:endParaRPr lang="ko-KR" altLang="en-US" sz="1400" dirty="0">
+              <a:endParaRPr lang="ko-KR" altLang="en-US" sz="1400" b="1" u="sng" dirty="0">
                 <a:latin typeface="D2Coding" panose="020B0609020101020101" pitchFamily="49" charset="-127"/>
                 <a:ea typeface="D2Coding" panose="020B0609020101020101" pitchFamily="49" charset="-127"/>
               </a:endParaRPr>
@@ -15524,48 +15524,48 @@
             <a:p>
               <a:pPr algn="ctr"/>
               <a:r>
-                <a:rPr lang="ko-KR" altLang="en-US" sz="1400" dirty="0">
+                <a:rPr lang="ko-KR" altLang="en-US" sz="1400" b="1" u="sng" dirty="0">
                   <a:latin typeface="D2Coding" panose="020B0609020101020101" pitchFamily="49" charset="-127"/>
                   <a:ea typeface="D2Coding" panose="020B0609020101020101" pitchFamily="49" charset="-127"/>
                 </a:rPr>
                 <a:t>가</a:t>
               </a:r>
               <a:r>
-                <a:rPr lang="en-US" altLang="ko-KR" sz="1400" dirty="0">
+                <a:rPr lang="en-US" altLang="ko-KR" sz="1400" b="1" u="sng" dirty="0">
                   <a:latin typeface="D2Coding" panose="020B0609020101020101" pitchFamily="49" charset="-127"/>
                   <a:ea typeface="D2Coding" panose="020B0609020101020101" pitchFamily="49" charset="-127"/>
                 </a:rPr>
                 <a:t>/</a:t>
               </a:r>
               <a:r>
-                <a:rPr lang="en" altLang="ko-KR" sz="1400" dirty="0">
+                <a:rPr lang="en" altLang="ko-KR" sz="1400" b="1" u="sng" dirty="0">
                   <a:latin typeface="D2Coding" panose="020B0609020101020101" pitchFamily="49" charset="-127"/>
                   <a:ea typeface="D2Coding" panose="020B0609020101020101" pitchFamily="49" charset="-127"/>
                 </a:rPr>
                 <a:t>VV+</a:t>
               </a:r>
               <a:r>
-                <a:rPr lang="ko-KR" altLang="en-US" sz="1400" dirty="0" err="1">
+                <a:rPr lang="ko-KR" altLang="en-US" sz="1400" b="1" u="sng" dirty="0" err="1">
                   <a:latin typeface="D2Coding" panose="020B0609020101020101" pitchFamily="49" charset="-127"/>
                   <a:ea typeface="D2Coding" panose="020B0609020101020101" pitchFamily="49" charset="-127"/>
                 </a:rPr>
                 <a:t>았</a:t>
               </a:r>
               <a:r>
-                <a:rPr lang="en-US" altLang="ko-KR" sz="1400" dirty="0">
+                <a:rPr lang="en-US" altLang="ko-KR" sz="1400" b="1" u="sng" dirty="0">
                   <a:latin typeface="D2Coding" panose="020B0609020101020101" pitchFamily="49" charset="-127"/>
                   <a:ea typeface="D2Coding" panose="020B0609020101020101" pitchFamily="49" charset="-127"/>
                 </a:rPr>
                 <a:t>/</a:t>
               </a:r>
               <a:r>
-                <a:rPr lang="en" altLang="ko-KR" sz="1400" dirty="0">
+                <a:rPr lang="en" altLang="ko-KR" sz="1400" b="1" u="sng" dirty="0">
                   <a:latin typeface="D2Coding" panose="020B0609020101020101" pitchFamily="49" charset="-127"/>
                   <a:ea typeface="D2Coding" panose="020B0609020101020101" pitchFamily="49" charset="-127"/>
                 </a:rPr>
                 <a:t>EP</a:t>
               </a:r>
-              <a:endParaRPr lang="ko-KR" altLang="en-US" sz="1400" dirty="0">
+              <a:endParaRPr lang="ko-KR" altLang="en-US" sz="1400" b="1" u="sng" dirty="0">
                 <a:latin typeface="D2Coding" panose="020B0609020101020101" pitchFamily="49" charset="-127"/>
                 <a:ea typeface="D2Coding" panose="020B0609020101020101" pitchFamily="49" charset="-127"/>
               </a:endParaRPr>
@@ -15620,20 +15620,20 @@
             <a:p>
               <a:pPr algn="ctr"/>
               <a:r>
-                <a:rPr lang="ko-KR" altLang="en-US" sz="1400" dirty="0">
+                <a:rPr lang="ko-KR" altLang="en-US" sz="1400" b="1" u="sng" dirty="0">
                   <a:latin typeface="D2Coding" panose="020B0609020101020101" pitchFamily="49" charset="-127"/>
                   <a:ea typeface="D2Coding" panose="020B0609020101020101" pitchFamily="49" charset="-127"/>
                 </a:rPr>
                 <a:t>다</a:t>
               </a:r>
               <a:r>
-                <a:rPr lang="en-US" altLang="ko-KR" sz="1400" dirty="0">
+                <a:rPr lang="en-US" altLang="ko-KR" sz="1400" b="1" u="sng" dirty="0">
                   <a:latin typeface="D2Coding" panose="020B0609020101020101" pitchFamily="49" charset="-127"/>
                   <a:ea typeface="D2Coding" panose="020B0609020101020101" pitchFamily="49" charset="-127"/>
                 </a:rPr>
                 <a:t>/EC</a:t>
               </a:r>
-              <a:endParaRPr lang="ko-KR" altLang="en-US" sz="1400" dirty="0">
+              <a:endParaRPr lang="ko-KR" altLang="en-US" sz="1400" b="1" u="sng" dirty="0">
                 <a:latin typeface="D2Coding" panose="020B0609020101020101" pitchFamily="49" charset="-127"/>
                 <a:ea typeface="D2Coding" panose="020B0609020101020101" pitchFamily="49" charset="-127"/>
               </a:endParaRPr>
@@ -15852,48 +15852,48 @@
             <a:p>
               <a:pPr algn="ctr"/>
               <a:r>
-                <a:rPr lang="ko-KR" altLang="en-US" sz="1400" dirty="0">
+                <a:rPr lang="ko-KR" altLang="en-US" sz="1400" b="1" u="sng" dirty="0">
                   <a:latin typeface="D2Coding" panose="020B0609020101020101" pitchFamily="49" charset="-127"/>
                   <a:ea typeface="D2Coding" panose="020B0609020101020101" pitchFamily="49" charset="-127"/>
                 </a:rPr>
                 <a:t>보</a:t>
               </a:r>
               <a:r>
-                <a:rPr lang="en-US" altLang="ko-KR" sz="1400" dirty="0">
+                <a:rPr lang="en-US" altLang="ko-KR" sz="1400" b="1" u="sng" dirty="0">
                   <a:latin typeface="D2Coding" panose="020B0609020101020101" pitchFamily="49" charset="-127"/>
                   <a:ea typeface="D2Coding" panose="020B0609020101020101" pitchFamily="49" charset="-127"/>
                 </a:rPr>
                 <a:t>/</a:t>
               </a:r>
               <a:r>
-                <a:rPr lang="en" altLang="ko-KR" sz="1400" dirty="0">
+                <a:rPr lang="en" altLang="ko-KR" sz="1400" b="1" u="sng" dirty="0">
                   <a:latin typeface="D2Coding" panose="020B0609020101020101" pitchFamily="49" charset="-127"/>
                   <a:ea typeface="D2Coding" panose="020B0609020101020101" pitchFamily="49" charset="-127"/>
                 </a:rPr>
                 <a:t>VX+</a:t>
               </a:r>
               <a:r>
-                <a:rPr lang="ko-KR" altLang="en-US" sz="1400" dirty="0">
+                <a:rPr lang="ko-KR" altLang="en-US" sz="1400" b="1" u="sng" dirty="0">
                   <a:latin typeface="D2Coding" panose="020B0609020101020101" pitchFamily="49" charset="-127"/>
                   <a:ea typeface="D2Coding" panose="020B0609020101020101" pitchFamily="49" charset="-127"/>
                 </a:rPr>
                 <a:t>아</a:t>
               </a:r>
               <a:r>
-                <a:rPr lang="en-US" altLang="ko-KR" sz="1400" dirty="0">
+                <a:rPr lang="en-US" altLang="ko-KR" sz="1400" b="1" u="sng" dirty="0">
                   <a:latin typeface="D2Coding" panose="020B0609020101020101" pitchFamily="49" charset="-127"/>
                   <a:ea typeface="D2Coding" panose="020B0609020101020101" pitchFamily="49" charset="-127"/>
                 </a:rPr>
                 <a:t>/</a:t>
               </a:r>
               <a:r>
-                <a:rPr lang="en" altLang="ko-KR" sz="1400" dirty="0">
+                <a:rPr lang="en" altLang="ko-KR" sz="1400" b="1" u="sng" dirty="0">
                   <a:latin typeface="D2Coding" panose="020B0609020101020101" pitchFamily="49" charset="-127"/>
                   <a:ea typeface="D2Coding" panose="020B0609020101020101" pitchFamily="49" charset="-127"/>
                 </a:rPr>
                 <a:t>EC</a:t>
               </a:r>
-              <a:endParaRPr lang="ko-KR" altLang="en-US" sz="1400" dirty="0">
+              <a:endParaRPr lang="ko-KR" altLang="en-US" sz="1400" b="1" u="sng" dirty="0">
                 <a:latin typeface="D2Coding" panose="020B0609020101020101" pitchFamily="49" charset="-127"/>
                 <a:ea typeface="D2Coding" panose="020B0609020101020101" pitchFamily="49" charset="-127"/>
               </a:endParaRPr>
@@ -16619,20 +16619,20 @@
             <a:p>
               <a:pPr algn="ctr"/>
               <a:r>
-                <a:rPr lang="ko-KR" altLang="en-US" sz="1400" dirty="0">
+                <a:rPr lang="ko-KR" altLang="en-US" sz="1400" b="1" u="sng" dirty="0">
                   <a:latin typeface="D2Coding" panose="020B0609020101020101" pitchFamily="49" charset="-127"/>
                   <a:ea typeface="D2Coding" panose="020B0609020101020101" pitchFamily="49" charset="-127"/>
                 </a:rPr>
                 <a:t>여행</a:t>
               </a:r>
               <a:r>
-                <a:rPr lang="en-US" altLang="ko-KR" sz="1400" dirty="0">
+                <a:rPr lang="en-US" altLang="ko-KR" sz="1400" b="1" u="sng" dirty="0">
                   <a:latin typeface="D2Coding" panose="020B0609020101020101" pitchFamily="49" charset="-127"/>
                   <a:ea typeface="D2Coding" panose="020B0609020101020101" pitchFamily="49" charset="-127"/>
                 </a:rPr>
                 <a:t>/NNG</a:t>
               </a:r>
-              <a:endParaRPr lang="ko-KR" altLang="en-US" sz="1400" dirty="0">
+              <a:endParaRPr lang="ko-KR" altLang="en-US" sz="1400" b="1" u="sng" dirty="0">
                 <a:latin typeface="D2Coding" panose="020B0609020101020101" pitchFamily="49" charset="-127"/>
                 <a:ea typeface="D2Coding" panose="020B0609020101020101" pitchFamily="49" charset="-127"/>
               </a:endParaRPr>
@@ -16687,20 +16687,20 @@
             <a:p>
               <a:pPr algn="ctr"/>
               <a:r>
-                <a:rPr lang="ko-KR" altLang="en-US" sz="1400" dirty="0">
+                <a:rPr lang="ko-KR" altLang="en-US" sz="1400" b="1" u="sng" dirty="0">
                   <a:latin typeface="D2Coding" panose="020B0609020101020101" pitchFamily="49" charset="-127"/>
                   <a:ea typeface="D2Coding" panose="020B0609020101020101" pitchFamily="49" charset="-127"/>
                 </a:rPr>
                 <a:t>을</a:t>
               </a:r>
               <a:r>
-                <a:rPr lang="en-US" altLang="ko-KR" sz="1400" dirty="0">
+                <a:rPr lang="en-US" altLang="ko-KR" sz="1400" b="1" u="sng" dirty="0">
                   <a:latin typeface="D2Coding" panose="020B0609020101020101" pitchFamily="49" charset="-127"/>
                   <a:ea typeface="D2Coding" panose="020B0609020101020101" pitchFamily="49" charset="-127"/>
                 </a:rPr>
                 <a:t>/JKO</a:t>
               </a:r>
-              <a:endParaRPr lang="ko-KR" altLang="en-US" sz="1400" dirty="0">
+              <a:endParaRPr lang="ko-KR" altLang="en-US" sz="1400" b="1" u="sng" dirty="0">
                 <a:latin typeface="D2Coding" panose="020B0609020101020101" pitchFamily="49" charset="-127"/>
                 <a:ea typeface="D2Coding" panose="020B0609020101020101" pitchFamily="49" charset="-127"/>
               </a:endParaRPr>
@@ -16755,48 +16755,48 @@
             <a:p>
               <a:pPr algn="ctr"/>
               <a:r>
-                <a:rPr lang="ko-KR" altLang="en-US" sz="1400" dirty="0">
+                <a:rPr lang="ko-KR" altLang="en-US" sz="1400" b="1" u="sng" dirty="0">
                   <a:latin typeface="D2Coding" panose="020B0609020101020101" pitchFamily="49" charset="-127"/>
                   <a:ea typeface="D2Coding" panose="020B0609020101020101" pitchFamily="49" charset="-127"/>
                 </a:rPr>
                 <a:t>가</a:t>
               </a:r>
               <a:r>
-                <a:rPr lang="en-US" altLang="ko-KR" sz="1400" dirty="0">
+                <a:rPr lang="en-US" altLang="ko-KR" sz="1400" b="1" u="sng" dirty="0">
                   <a:latin typeface="D2Coding" panose="020B0609020101020101" pitchFamily="49" charset="-127"/>
                   <a:ea typeface="D2Coding" panose="020B0609020101020101" pitchFamily="49" charset="-127"/>
                 </a:rPr>
                 <a:t>/</a:t>
               </a:r>
               <a:r>
-                <a:rPr lang="en" altLang="ko-KR" sz="1400" dirty="0">
+                <a:rPr lang="en" altLang="ko-KR" sz="1400" b="1" u="sng" dirty="0">
                   <a:latin typeface="D2Coding" panose="020B0609020101020101" pitchFamily="49" charset="-127"/>
                   <a:ea typeface="D2Coding" panose="020B0609020101020101" pitchFamily="49" charset="-127"/>
                 </a:rPr>
                 <a:t>VV+</a:t>
               </a:r>
               <a:r>
-                <a:rPr lang="ko-KR" altLang="en-US" sz="1400" dirty="0" err="1">
+                <a:rPr lang="ko-KR" altLang="en-US" sz="1400" b="1" u="sng" dirty="0" err="1">
                   <a:latin typeface="D2Coding" panose="020B0609020101020101" pitchFamily="49" charset="-127"/>
                   <a:ea typeface="D2Coding" panose="020B0609020101020101" pitchFamily="49" charset="-127"/>
                 </a:rPr>
                 <a:t>았</a:t>
               </a:r>
               <a:r>
-                <a:rPr lang="en-US" altLang="ko-KR" sz="1400" dirty="0">
+                <a:rPr lang="en-US" altLang="ko-KR" sz="1400" b="1" u="sng" dirty="0">
                   <a:latin typeface="D2Coding" panose="020B0609020101020101" pitchFamily="49" charset="-127"/>
                   <a:ea typeface="D2Coding" panose="020B0609020101020101" pitchFamily="49" charset="-127"/>
                 </a:rPr>
                 <a:t>/</a:t>
               </a:r>
               <a:r>
-                <a:rPr lang="en" altLang="ko-KR" sz="1400" dirty="0">
+                <a:rPr lang="en" altLang="ko-KR" sz="1400" b="1" u="sng" dirty="0">
                   <a:latin typeface="D2Coding" panose="020B0609020101020101" pitchFamily="49" charset="-127"/>
                   <a:ea typeface="D2Coding" panose="020B0609020101020101" pitchFamily="49" charset="-127"/>
                 </a:rPr>
                 <a:t>EP</a:t>
               </a:r>
-              <a:endParaRPr lang="ko-KR" altLang="en-US" sz="1400" dirty="0">
+              <a:endParaRPr lang="ko-KR" altLang="en-US" sz="1400" b="1" u="sng" dirty="0">
                 <a:latin typeface="D2Coding" panose="020B0609020101020101" pitchFamily="49" charset="-127"/>
                 <a:ea typeface="D2Coding" panose="020B0609020101020101" pitchFamily="49" charset="-127"/>
               </a:endParaRPr>
@@ -16851,20 +16851,20 @@
             <a:p>
               <a:pPr algn="ctr"/>
               <a:r>
-                <a:rPr lang="ko-KR" altLang="en-US" sz="1400" dirty="0">
+                <a:rPr lang="ko-KR" altLang="en-US" sz="1400" b="1" u="sng" dirty="0">
                   <a:latin typeface="D2Coding" panose="020B0609020101020101" pitchFamily="49" charset="-127"/>
                   <a:ea typeface="D2Coding" panose="020B0609020101020101" pitchFamily="49" charset="-127"/>
                 </a:rPr>
                 <a:t>다</a:t>
               </a:r>
               <a:r>
-                <a:rPr lang="en-US" altLang="ko-KR" sz="1400" dirty="0">
+                <a:rPr lang="en-US" altLang="ko-KR" sz="1400" b="1" u="sng" dirty="0">
                   <a:latin typeface="D2Coding" panose="020B0609020101020101" pitchFamily="49" charset="-127"/>
                   <a:ea typeface="D2Coding" panose="020B0609020101020101" pitchFamily="49" charset="-127"/>
                 </a:rPr>
                 <a:t>/EC</a:t>
               </a:r>
-              <a:endParaRPr lang="ko-KR" altLang="en-US" sz="1400" dirty="0">
+              <a:endParaRPr lang="ko-KR" altLang="en-US" sz="1400" b="1" u="sng" dirty="0">
                 <a:latin typeface="D2Coding" panose="020B0609020101020101" pitchFamily="49" charset="-127"/>
                 <a:ea typeface="D2Coding" panose="020B0609020101020101" pitchFamily="49" charset="-127"/>
               </a:endParaRPr>
@@ -16919,48 +16919,48 @@
             <a:p>
               <a:pPr algn="ctr"/>
               <a:r>
-                <a:rPr lang="ko-KR" altLang="en-US" sz="1400" dirty="0">
+                <a:rPr lang="ko-KR" altLang="en-US" sz="1400" b="1" u="sng" dirty="0">
                   <a:latin typeface="D2Coding" panose="020B0609020101020101" pitchFamily="49" charset="-127"/>
                   <a:ea typeface="D2Coding" panose="020B0609020101020101" pitchFamily="49" charset="-127"/>
                 </a:rPr>
                 <a:t>오</a:t>
               </a:r>
               <a:r>
-                <a:rPr lang="en-US" altLang="ko-KR" sz="1400" dirty="0">
+                <a:rPr lang="en-US" altLang="ko-KR" sz="1400" b="1" u="sng" dirty="0">
                   <a:latin typeface="D2Coding" panose="020B0609020101020101" pitchFamily="49" charset="-127"/>
                   <a:ea typeface="D2Coding" panose="020B0609020101020101" pitchFamily="49" charset="-127"/>
                 </a:rPr>
                 <a:t>/</a:t>
               </a:r>
               <a:r>
-                <a:rPr lang="en" altLang="ko-KR" sz="1400" dirty="0">
+                <a:rPr lang="en" altLang="ko-KR" sz="1400" b="1" u="sng" dirty="0">
                   <a:latin typeface="D2Coding" panose="020B0609020101020101" pitchFamily="49" charset="-127"/>
                   <a:ea typeface="D2Coding" panose="020B0609020101020101" pitchFamily="49" charset="-127"/>
                 </a:rPr>
                 <a:t>VX+</a:t>
               </a:r>
               <a:r>
-                <a:rPr lang="ko-KR" altLang="en-US" sz="1400" dirty="0" err="1">
+                <a:rPr lang="ko-KR" altLang="en-US" sz="1400" b="1" u="sng" dirty="0" err="1">
                   <a:latin typeface="D2Coding" panose="020B0609020101020101" pitchFamily="49" charset="-127"/>
                   <a:ea typeface="D2Coding" panose="020B0609020101020101" pitchFamily="49" charset="-127"/>
                 </a:rPr>
                 <a:t>았</a:t>
               </a:r>
               <a:r>
-                <a:rPr lang="en-US" altLang="ko-KR" sz="1400" dirty="0">
+                <a:rPr lang="en-US" altLang="ko-KR" sz="1400" b="1" u="sng" dirty="0">
                   <a:latin typeface="D2Coding" panose="020B0609020101020101" pitchFamily="49" charset="-127"/>
                   <a:ea typeface="D2Coding" panose="020B0609020101020101" pitchFamily="49" charset="-127"/>
                 </a:rPr>
                 <a:t>/</a:t>
               </a:r>
               <a:r>
-                <a:rPr lang="en" altLang="ko-KR" sz="1400" dirty="0">
+                <a:rPr lang="en" altLang="ko-KR" sz="1400" b="1" u="sng" dirty="0">
                   <a:latin typeface="D2Coding" panose="020B0609020101020101" pitchFamily="49" charset="-127"/>
                   <a:ea typeface="D2Coding" panose="020B0609020101020101" pitchFamily="49" charset="-127"/>
                 </a:rPr>
                 <a:t>EP</a:t>
               </a:r>
-              <a:endParaRPr lang="ko-KR" altLang="en-US" sz="1400" dirty="0">
+              <a:endParaRPr lang="ko-KR" altLang="en-US" sz="1400" b="1" u="sng" dirty="0">
                 <a:latin typeface="D2Coding" panose="020B0609020101020101" pitchFamily="49" charset="-127"/>
                 <a:ea typeface="D2Coding" panose="020B0609020101020101" pitchFamily="49" charset="-127"/>
               </a:endParaRPr>
@@ -17015,20 +17015,20 @@
             <a:p>
               <a:pPr algn="ctr"/>
               <a:r>
-                <a:rPr lang="ko-KR" altLang="en-US" sz="1400" dirty="0">
+                <a:rPr lang="ko-KR" altLang="en-US" sz="1400" b="1" u="sng" dirty="0">
                   <a:latin typeface="D2Coding" panose="020B0609020101020101" pitchFamily="49" charset="-127"/>
                   <a:ea typeface="D2Coding" panose="020B0609020101020101" pitchFamily="49" charset="-127"/>
                 </a:rPr>
                 <a:t>나</a:t>
               </a:r>
               <a:r>
-                <a:rPr lang="en-US" altLang="ko-KR" sz="1400" dirty="0">
+                <a:rPr lang="en-US" altLang="ko-KR" sz="1400" b="1" u="sng" dirty="0">
                   <a:latin typeface="D2Coding" panose="020B0609020101020101" pitchFamily="49" charset="-127"/>
                   <a:ea typeface="D2Coding" panose="020B0609020101020101" pitchFamily="49" charset="-127"/>
                 </a:rPr>
                 <a:t>/EC</a:t>
               </a:r>
-              <a:endParaRPr lang="ko-KR" altLang="en-US" sz="1400" dirty="0">
+              <a:endParaRPr lang="ko-KR" altLang="en-US" sz="1400" b="1" u="sng" dirty="0">
                 <a:latin typeface="D2Coding" panose="020B0609020101020101" pitchFamily="49" charset="-127"/>
                 <a:ea typeface="D2Coding" panose="020B0609020101020101" pitchFamily="49" charset="-127"/>
               </a:endParaRPr>
@@ -17083,48 +17083,48 @@
             <a:p>
               <a:pPr algn="ctr"/>
               <a:r>
-                <a:rPr lang="ko-KR" altLang="en-US" sz="1400" dirty="0">
+                <a:rPr lang="ko-KR" altLang="en-US" sz="1400" b="1" u="sng" dirty="0">
                   <a:latin typeface="D2Coding" panose="020B0609020101020101" pitchFamily="49" charset="-127"/>
                   <a:ea typeface="D2Coding" panose="020B0609020101020101" pitchFamily="49" charset="-127"/>
                 </a:rPr>
                 <a:t>보</a:t>
               </a:r>
               <a:r>
-                <a:rPr lang="en-US" altLang="ko-KR" sz="1400" dirty="0">
+                <a:rPr lang="en-US" altLang="ko-KR" sz="1400" b="1" u="sng" dirty="0">
                   <a:latin typeface="D2Coding" panose="020B0609020101020101" pitchFamily="49" charset="-127"/>
                   <a:ea typeface="D2Coding" panose="020B0609020101020101" pitchFamily="49" charset="-127"/>
                 </a:rPr>
                 <a:t>/</a:t>
               </a:r>
               <a:r>
-                <a:rPr lang="en" altLang="ko-KR" sz="1400" dirty="0">
+                <a:rPr lang="en" altLang="ko-KR" sz="1400" b="1" u="sng" dirty="0">
                   <a:latin typeface="D2Coding" panose="020B0609020101020101" pitchFamily="49" charset="-127"/>
                   <a:ea typeface="D2Coding" panose="020B0609020101020101" pitchFamily="49" charset="-127"/>
                 </a:rPr>
                 <a:t>VX+</a:t>
               </a:r>
               <a:r>
-                <a:rPr lang="ko-KR" altLang="en-US" sz="1400" dirty="0">
+                <a:rPr lang="ko-KR" altLang="en-US" sz="1400" b="1" u="sng" dirty="0">
                   <a:latin typeface="D2Coding" panose="020B0609020101020101" pitchFamily="49" charset="-127"/>
                   <a:ea typeface="D2Coding" panose="020B0609020101020101" pitchFamily="49" charset="-127"/>
                 </a:rPr>
                 <a:t>아</a:t>
               </a:r>
               <a:r>
-                <a:rPr lang="en-US" altLang="ko-KR" sz="1400" dirty="0">
+                <a:rPr lang="en-US" altLang="ko-KR" sz="1400" b="1" u="sng" dirty="0">
                   <a:latin typeface="D2Coding" panose="020B0609020101020101" pitchFamily="49" charset="-127"/>
                   <a:ea typeface="D2Coding" panose="020B0609020101020101" pitchFamily="49" charset="-127"/>
                 </a:rPr>
                 <a:t>/</a:t>
               </a:r>
               <a:r>
-                <a:rPr lang="en" altLang="ko-KR" sz="1400" dirty="0">
+                <a:rPr lang="en" altLang="ko-KR" sz="1400" b="1" u="sng" dirty="0">
                   <a:latin typeface="D2Coding" panose="020B0609020101020101" pitchFamily="49" charset="-127"/>
                   <a:ea typeface="D2Coding" panose="020B0609020101020101" pitchFamily="49" charset="-127"/>
                 </a:rPr>
                 <a:t>EC</a:t>
               </a:r>
-              <a:endParaRPr lang="ko-KR" altLang="en-US" sz="1400" dirty="0">
+              <a:endParaRPr lang="ko-KR" altLang="en-US" sz="1400" b="1" u="sng" dirty="0">
                 <a:latin typeface="D2Coding" panose="020B0609020101020101" pitchFamily="49" charset="-127"/>
                 <a:ea typeface="D2Coding" panose="020B0609020101020101" pitchFamily="49" charset="-127"/>
               </a:endParaRPr>
@@ -17835,20 +17835,20 @@
             <a:p>
               <a:pPr algn="ctr"/>
               <a:r>
-                <a:rPr lang="ko-KR" altLang="en-US" sz="1400" dirty="0">
+                <a:rPr lang="ko-KR" altLang="en-US" sz="1400" b="1" u="sng" dirty="0">
                   <a:latin typeface="D2Coding" panose="020B0609020101020101" pitchFamily="49" charset="-127"/>
                   <a:ea typeface="D2Coding" panose="020B0609020101020101" pitchFamily="49" charset="-127"/>
                 </a:rPr>
                 <a:t>여행</a:t>
               </a:r>
               <a:r>
-                <a:rPr lang="en-US" altLang="ko-KR" sz="1400" dirty="0">
+                <a:rPr lang="en-US" altLang="ko-KR" sz="1400" b="1" u="sng" dirty="0">
                   <a:latin typeface="D2Coding" panose="020B0609020101020101" pitchFamily="49" charset="-127"/>
                   <a:ea typeface="D2Coding" panose="020B0609020101020101" pitchFamily="49" charset="-127"/>
                 </a:rPr>
                 <a:t>/NNG</a:t>
               </a:r>
-              <a:endParaRPr lang="ko-KR" altLang="en-US" sz="1400" dirty="0">
+              <a:endParaRPr lang="ko-KR" altLang="en-US" sz="1400" b="1" u="sng" dirty="0">
                 <a:latin typeface="D2Coding" panose="020B0609020101020101" pitchFamily="49" charset="-127"/>
                 <a:ea typeface="D2Coding" panose="020B0609020101020101" pitchFamily="49" charset="-127"/>
               </a:endParaRPr>
@@ -17903,20 +17903,20 @@
             <a:p>
               <a:pPr algn="ctr"/>
               <a:r>
-                <a:rPr lang="ko-KR" altLang="en-US" sz="1400" dirty="0">
+                <a:rPr lang="ko-KR" altLang="en-US" sz="1400" b="1" u="sng" dirty="0">
                   <a:latin typeface="D2Coding" panose="020B0609020101020101" pitchFamily="49" charset="-127"/>
                   <a:ea typeface="D2Coding" panose="020B0609020101020101" pitchFamily="49" charset="-127"/>
                 </a:rPr>
                 <a:t>을</a:t>
               </a:r>
               <a:r>
-                <a:rPr lang="en-US" altLang="ko-KR" sz="1400" dirty="0">
+                <a:rPr lang="en-US" altLang="ko-KR" sz="1400" b="1" u="sng" dirty="0">
                   <a:latin typeface="D2Coding" panose="020B0609020101020101" pitchFamily="49" charset="-127"/>
                   <a:ea typeface="D2Coding" panose="020B0609020101020101" pitchFamily="49" charset="-127"/>
                 </a:rPr>
                 <a:t>/JKO</a:t>
               </a:r>
-              <a:endParaRPr lang="ko-KR" altLang="en-US" sz="1400" dirty="0">
+              <a:endParaRPr lang="ko-KR" altLang="en-US" sz="1400" b="1" u="sng" dirty="0">
                 <a:latin typeface="D2Coding" panose="020B0609020101020101" pitchFamily="49" charset="-127"/>
                 <a:ea typeface="D2Coding" panose="020B0609020101020101" pitchFamily="49" charset="-127"/>
               </a:endParaRPr>
@@ -17971,48 +17971,48 @@
             <a:p>
               <a:pPr algn="ctr"/>
               <a:r>
-                <a:rPr lang="ko-KR" altLang="en-US" sz="1400" dirty="0">
+                <a:rPr lang="ko-KR" altLang="en-US" sz="1400" b="1" u="sng" dirty="0">
                   <a:latin typeface="D2Coding" panose="020B0609020101020101" pitchFamily="49" charset="-127"/>
                   <a:ea typeface="D2Coding" panose="020B0609020101020101" pitchFamily="49" charset="-127"/>
                 </a:rPr>
                 <a:t>가</a:t>
               </a:r>
               <a:r>
-                <a:rPr lang="en-US" altLang="ko-KR" sz="1400" dirty="0">
+                <a:rPr lang="en-US" altLang="ko-KR" sz="1400" b="1" u="sng" dirty="0">
                   <a:latin typeface="D2Coding" panose="020B0609020101020101" pitchFamily="49" charset="-127"/>
                   <a:ea typeface="D2Coding" panose="020B0609020101020101" pitchFamily="49" charset="-127"/>
                 </a:rPr>
                 <a:t>/</a:t>
               </a:r>
               <a:r>
-                <a:rPr lang="en" altLang="ko-KR" sz="1400" dirty="0">
+                <a:rPr lang="en" altLang="ko-KR" sz="1400" b="1" u="sng" dirty="0">
                   <a:latin typeface="D2Coding" panose="020B0609020101020101" pitchFamily="49" charset="-127"/>
                   <a:ea typeface="D2Coding" panose="020B0609020101020101" pitchFamily="49" charset="-127"/>
                 </a:rPr>
                 <a:t>VV+</a:t>
               </a:r>
               <a:r>
-                <a:rPr lang="ko-KR" altLang="en-US" sz="1400" dirty="0" err="1">
+                <a:rPr lang="ko-KR" altLang="en-US" sz="1400" b="1" u="sng" dirty="0" err="1">
                   <a:latin typeface="D2Coding" panose="020B0609020101020101" pitchFamily="49" charset="-127"/>
                   <a:ea typeface="D2Coding" panose="020B0609020101020101" pitchFamily="49" charset="-127"/>
                 </a:rPr>
                 <a:t>았</a:t>
               </a:r>
               <a:r>
-                <a:rPr lang="en-US" altLang="ko-KR" sz="1400" dirty="0">
+                <a:rPr lang="en-US" altLang="ko-KR" sz="1400" b="1" u="sng" dirty="0">
                   <a:latin typeface="D2Coding" panose="020B0609020101020101" pitchFamily="49" charset="-127"/>
                   <a:ea typeface="D2Coding" panose="020B0609020101020101" pitchFamily="49" charset="-127"/>
                 </a:rPr>
                 <a:t>/</a:t>
               </a:r>
               <a:r>
-                <a:rPr lang="en" altLang="ko-KR" sz="1400" dirty="0">
+                <a:rPr lang="en" altLang="ko-KR" sz="1400" b="1" u="sng" dirty="0">
                   <a:latin typeface="D2Coding" panose="020B0609020101020101" pitchFamily="49" charset="-127"/>
                   <a:ea typeface="D2Coding" panose="020B0609020101020101" pitchFamily="49" charset="-127"/>
                 </a:rPr>
                 <a:t>EP</a:t>
               </a:r>
-              <a:endParaRPr lang="ko-KR" altLang="en-US" sz="1400" dirty="0">
+              <a:endParaRPr lang="ko-KR" altLang="en-US" sz="1400" b="1" u="sng" dirty="0">
                 <a:latin typeface="D2Coding" panose="020B0609020101020101" pitchFamily="49" charset="-127"/>
                 <a:ea typeface="D2Coding" panose="020B0609020101020101" pitchFamily="49" charset="-127"/>
               </a:endParaRPr>
@@ -18067,20 +18067,20 @@
             <a:p>
               <a:pPr algn="ctr"/>
               <a:r>
-                <a:rPr lang="ko-KR" altLang="en-US" sz="1400" dirty="0">
+                <a:rPr lang="ko-KR" altLang="en-US" sz="1400" b="1" u="sng" dirty="0">
                   <a:latin typeface="D2Coding" panose="020B0609020101020101" pitchFamily="49" charset="-127"/>
                   <a:ea typeface="D2Coding" panose="020B0609020101020101" pitchFamily="49" charset="-127"/>
                 </a:rPr>
                 <a:t>다</a:t>
               </a:r>
               <a:r>
-                <a:rPr lang="en-US" altLang="ko-KR" sz="1400" dirty="0">
+                <a:rPr lang="en-US" altLang="ko-KR" sz="1400" b="1" u="sng" dirty="0">
                   <a:latin typeface="D2Coding" panose="020B0609020101020101" pitchFamily="49" charset="-127"/>
                   <a:ea typeface="D2Coding" panose="020B0609020101020101" pitchFamily="49" charset="-127"/>
                 </a:rPr>
                 <a:t>/EC</a:t>
               </a:r>
-              <a:endParaRPr lang="ko-KR" altLang="en-US" sz="1400" dirty="0">
+              <a:endParaRPr lang="ko-KR" altLang="en-US" sz="1400" b="1" u="sng" dirty="0">
                 <a:latin typeface="D2Coding" panose="020B0609020101020101" pitchFamily="49" charset="-127"/>
                 <a:ea typeface="D2Coding" panose="020B0609020101020101" pitchFamily="49" charset="-127"/>
               </a:endParaRPr>
@@ -18135,48 +18135,48 @@
             <a:p>
               <a:pPr algn="ctr"/>
               <a:r>
-                <a:rPr lang="ko-KR" altLang="en-US" sz="1400" dirty="0">
+                <a:rPr lang="ko-KR" altLang="en-US" sz="1400" b="1" u="sng" dirty="0">
                   <a:latin typeface="D2Coding" panose="020B0609020101020101" pitchFamily="49" charset="-127"/>
                   <a:ea typeface="D2Coding" panose="020B0609020101020101" pitchFamily="49" charset="-127"/>
                 </a:rPr>
                 <a:t>오</a:t>
               </a:r>
               <a:r>
-                <a:rPr lang="en-US" altLang="ko-KR" sz="1400" dirty="0">
+                <a:rPr lang="en-US" altLang="ko-KR" sz="1400" b="1" u="sng" dirty="0">
                   <a:latin typeface="D2Coding" panose="020B0609020101020101" pitchFamily="49" charset="-127"/>
                   <a:ea typeface="D2Coding" panose="020B0609020101020101" pitchFamily="49" charset="-127"/>
                 </a:rPr>
                 <a:t>/</a:t>
               </a:r>
               <a:r>
-                <a:rPr lang="en" altLang="ko-KR" sz="1400" dirty="0">
+                <a:rPr lang="en" altLang="ko-KR" sz="1400" b="1" u="sng" dirty="0">
                   <a:latin typeface="D2Coding" panose="020B0609020101020101" pitchFamily="49" charset="-127"/>
                   <a:ea typeface="D2Coding" panose="020B0609020101020101" pitchFamily="49" charset="-127"/>
                 </a:rPr>
                 <a:t>VX+</a:t>
               </a:r>
               <a:r>
-                <a:rPr lang="ko-KR" altLang="en-US" sz="1400" dirty="0" err="1">
+                <a:rPr lang="ko-KR" altLang="en-US" sz="1400" b="1" u="sng" dirty="0" err="1">
                   <a:latin typeface="D2Coding" panose="020B0609020101020101" pitchFamily="49" charset="-127"/>
                   <a:ea typeface="D2Coding" panose="020B0609020101020101" pitchFamily="49" charset="-127"/>
                 </a:rPr>
                 <a:t>았</a:t>
               </a:r>
               <a:r>
-                <a:rPr lang="en-US" altLang="ko-KR" sz="1400" dirty="0">
+                <a:rPr lang="en-US" altLang="ko-KR" sz="1400" b="1" u="sng" dirty="0">
                   <a:latin typeface="D2Coding" panose="020B0609020101020101" pitchFamily="49" charset="-127"/>
                   <a:ea typeface="D2Coding" panose="020B0609020101020101" pitchFamily="49" charset="-127"/>
                 </a:rPr>
                 <a:t>/</a:t>
               </a:r>
               <a:r>
-                <a:rPr lang="en" altLang="ko-KR" sz="1400" dirty="0">
+                <a:rPr lang="en" altLang="ko-KR" sz="1400" b="1" u="sng" dirty="0">
                   <a:latin typeface="D2Coding" panose="020B0609020101020101" pitchFamily="49" charset="-127"/>
                   <a:ea typeface="D2Coding" panose="020B0609020101020101" pitchFamily="49" charset="-127"/>
                 </a:rPr>
                 <a:t>EP</a:t>
               </a:r>
-              <a:endParaRPr lang="ko-KR" altLang="en-US" sz="1400" dirty="0">
+              <a:endParaRPr lang="ko-KR" altLang="en-US" sz="1400" b="1" u="sng" dirty="0">
                 <a:latin typeface="D2Coding" panose="020B0609020101020101" pitchFamily="49" charset="-127"/>
                 <a:ea typeface="D2Coding" panose="020B0609020101020101" pitchFamily="49" charset="-127"/>
               </a:endParaRPr>

</xml_diff>